<commit_message>
Rewrite FT for ColorsLab (buttons, sliders and monochrome colors)
</commit_message>
<xml_diff>
--- a/doc/test/ColorsLab/ColorsLab.pptx
+++ b/doc/test/ColorsLab/ColorsLab.pptx
@@ -7,15 +7,18 @@
     <p:sldMasterId id="2147483672" r:id="rId3"/>
   </p:sldMasterIdLst>
   <p:notesMasterIdLst>
-    <p:notesMasterId r:id="rId10"/>
+    <p:notesMasterId r:id="rId13"/>
   </p:notesMasterIdLst>
   <p:sldIdLst>
     <p:sldId id="287" r:id="rId4"/>
     <p:sldId id="256" r:id="rId5"/>
     <p:sldId id="295" r:id="rId6"/>
-    <p:sldId id="293" r:id="rId7"/>
-    <p:sldId id="296" r:id="rId8"/>
-    <p:sldId id="274" r:id="rId9"/>
+    <p:sldId id="296" r:id="rId7"/>
+    <p:sldId id="300" r:id="rId8"/>
+    <p:sldId id="298" r:id="rId9"/>
+    <p:sldId id="301" r:id="rId10"/>
+    <p:sldId id="302" r:id="rId11"/>
+    <p:sldId id="274" r:id="rId12"/>
   </p:sldIdLst>
   <p:sldSz cx="9144000" cy="6858000" type="screen4x3"/>
   <p:notesSz cx="6858000" cy="9144000"/>
@@ -126,8 +129,11 @@
           <p14:sldIdLst>
             <p14:sldId id="256"/>
             <p14:sldId id="295"/>
-            <p14:sldId id="293"/>
             <p14:sldId id="296"/>
+            <p14:sldId id="300"/>
+            <p14:sldId id="298"/>
+            <p14:sldId id="301"/>
+            <p14:sldId id="302"/>
             <p14:sldId id="274"/>
           </p14:sldIdLst>
         </p14:section>
@@ -233,7 +239,7 @@
           <a:p>
             <a:fld id="{26004F41-C1A1-4B0D-9EEE-5E3F0E5BC108}" type="datetimeFigureOut">
               <a:rPr lang="en-SG" smtClean="0"/>
-              <a:t>21/6/2015</a:t>
+              <a:t>19/2/2019</a:t>
             </a:fld>
             <a:endParaRPr lang="en-SG"/>
           </a:p>
@@ -642,14 +648,10 @@
           <a:lstStyle/>
           <a:p>
             <a:r>
-              <a:rPr lang="en-US" altLang="zh-CN" sz="1200" b="1" dirty="0" smtClean="0">
-                <a:solidFill>
-                  <a:srgbClr val="00B050"/>
-                </a:solidFill>
-              </a:rPr>
-              <a:t>Expected</a:t>
-            </a:r>
-            <a:endParaRPr lang="zh-CN" altLang="en-US" dirty="0"/>
+              <a:rPr lang="en-US" altLang="zh-CN" b="1" dirty="0" smtClean="0"/>
+              <a:t>Expected: After apply font.</a:t>
+            </a:r>
+            <a:endParaRPr lang="zh-CN" altLang="en-US" b="1" dirty="0"/>
           </a:p>
         </p:txBody>
       </p:sp>
@@ -679,7 +681,7 @@
     </p:spTree>
     <p:extLst>
       <p:ext uri="{BB962C8B-B14F-4D97-AF65-F5344CB8AC3E}">
-        <p14:creationId xmlns:p14="http://schemas.microsoft.com/office/powerpoint/2010/main" val="1166831268"/>
+        <p14:creationId xmlns:p14="http://schemas.microsoft.com/office/powerpoint/2010/main" val="2181978761"/>
       </p:ext>
     </p:extLst>
   </p:cSld>
@@ -734,22 +736,10 @@
           <a:lstStyle/>
           <a:p>
             <a:r>
-              <a:rPr lang="en-US" altLang="zh-CN" sz="1200" b="1" dirty="0" smtClean="0">
-                <a:solidFill>
-                  <a:srgbClr val="00B050"/>
-                </a:solidFill>
-              </a:rPr>
-              <a:t>Expected 2: when apply blue’s mono </a:t>
-            </a:r>
-            <a:r>
-              <a:rPr lang="en-US" altLang="zh-CN" sz="1200" b="1" smtClean="0">
-                <a:solidFill>
-                  <a:srgbClr val="00B050"/>
-                </a:solidFill>
-              </a:rPr>
-              <a:t>color 7</a:t>
-            </a:r>
-            <a:endParaRPr lang="zh-CN" altLang="en-US" dirty="0"/>
+              <a:rPr lang="en-US" altLang="zh-CN" b="1" dirty="0" smtClean="0"/>
+              <a:t>Expected: After apply line.</a:t>
+            </a:r>
+            <a:endParaRPr lang="zh-CN" altLang="en-US" b="1" dirty="0"/>
           </a:p>
         </p:txBody>
       </p:sp>
@@ -779,7 +769,295 @@
     </p:spTree>
     <p:extLst>
       <p:ext uri="{BB962C8B-B14F-4D97-AF65-F5344CB8AC3E}">
-        <p14:creationId xmlns:p14="http://schemas.microsoft.com/office/powerpoint/2010/main" val="3611953192"/>
+        <p14:creationId xmlns:p14="http://schemas.microsoft.com/office/powerpoint/2010/main" val="538504932"/>
+      </p:ext>
+    </p:extLst>
+  </p:cSld>
+  <p:clrMapOvr>
+    <a:masterClrMapping/>
+  </p:clrMapOvr>
+</p:notes>
+</file>
+
+<file path=ppt/notesSlides/notesSlide4.xml><?xml version="1.0" encoding="utf-8"?>
+<p:notes xmlns:a="http://schemas.openxmlformats.org/drawingml/2006/main" xmlns:r="http://schemas.openxmlformats.org/officeDocument/2006/relationships" xmlns:p="http://schemas.openxmlformats.org/presentationml/2006/main">
+  <p:cSld>
+    <p:spTree>
+      <p:nvGrpSpPr>
+        <p:cNvPr id="1" name=""/>
+        <p:cNvGrpSpPr/>
+        <p:nvPr/>
+      </p:nvGrpSpPr>
+      <p:grpSpPr>
+        <a:xfrm>
+          <a:off x="0" y="0"/>
+          <a:ext cx="0" cy="0"/>
+          <a:chOff x="0" y="0"/>
+          <a:chExt cx="0" cy="0"/>
+        </a:xfrm>
+      </p:grpSpPr>
+      <p:sp>
+        <p:nvSpPr>
+          <p:cNvPr id="2" name="Slide Image Placeholder 1"/>
+          <p:cNvSpPr>
+            <a:spLocks noGrp="1" noRot="1" noChangeAspect="1"/>
+          </p:cNvSpPr>
+          <p:nvPr>
+            <p:ph type="sldImg"/>
+          </p:nvPr>
+        </p:nvSpPr>
+        <p:spPr/>
+      </p:sp>
+      <p:sp>
+        <p:nvSpPr>
+          <p:cNvPr id="3" name="Notes Placeholder 2"/>
+          <p:cNvSpPr>
+            <a:spLocks noGrp="1"/>
+          </p:cNvSpPr>
+          <p:nvPr>
+            <p:ph type="body" idx="1"/>
+          </p:nvPr>
+        </p:nvSpPr>
+        <p:spPr/>
+        <p:txBody>
+          <a:bodyPr/>
+          <a:lstStyle/>
+          <a:p>
+            <a:r>
+              <a:rPr lang="en-US" altLang="zh-CN" b="1" dirty="0" smtClean="0"/>
+              <a:t>Expected: After </a:t>
+            </a:r>
+            <a:r>
+              <a:rPr lang="en-US" altLang="zh-CN" b="1" smtClean="0"/>
+              <a:t>apply fill.</a:t>
+            </a:r>
+            <a:endParaRPr lang="zh-CN" altLang="en-US" b="1" dirty="0"/>
+          </a:p>
+        </p:txBody>
+      </p:sp>
+      <p:sp>
+        <p:nvSpPr>
+          <p:cNvPr id="4" name="Slide Number Placeholder 3"/>
+          <p:cNvSpPr>
+            <a:spLocks noGrp="1"/>
+          </p:cNvSpPr>
+          <p:nvPr>
+            <p:ph type="sldNum" sz="quarter" idx="10"/>
+          </p:nvPr>
+        </p:nvSpPr>
+        <p:spPr/>
+        <p:txBody>
+          <a:bodyPr/>
+          <a:lstStyle/>
+          <a:p>
+            <a:fld id="{E96FB07A-B1AD-4238-A6C9-967239C45D18}" type="slidenum">
+              <a:rPr lang="en-SG" smtClean="0"/>
+              <a:t>6</a:t>
+            </a:fld>
+            <a:endParaRPr lang="en-SG"/>
+          </a:p>
+        </p:txBody>
+      </p:sp>
+    </p:spTree>
+    <p:extLst>
+      <p:ext uri="{BB962C8B-B14F-4D97-AF65-F5344CB8AC3E}">
+        <p14:creationId xmlns:p14="http://schemas.microsoft.com/office/powerpoint/2010/main" val="3611096960"/>
+      </p:ext>
+    </p:extLst>
+  </p:cSld>
+  <p:clrMapOvr>
+    <a:masterClrMapping/>
+  </p:clrMapOvr>
+</p:notes>
+</file>
+
+<file path=ppt/notesSlides/notesSlide5.xml><?xml version="1.0" encoding="utf-8"?>
+<p:notes xmlns:a="http://schemas.openxmlformats.org/drawingml/2006/main" xmlns:r="http://schemas.openxmlformats.org/officeDocument/2006/relationships" xmlns:p="http://schemas.openxmlformats.org/presentationml/2006/main">
+  <p:cSld>
+    <p:spTree>
+      <p:nvGrpSpPr>
+        <p:cNvPr id="1" name=""/>
+        <p:cNvGrpSpPr/>
+        <p:nvPr/>
+      </p:nvGrpSpPr>
+      <p:grpSpPr>
+        <a:xfrm>
+          <a:off x="0" y="0"/>
+          <a:ext cx="0" cy="0"/>
+          <a:chOff x="0" y="0"/>
+          <a:chExt cx="0" cy="0"/>
+        </a:xfrm>
+      </p:grpSpPr>
+      <p:sp>
+        <p:nvSpPr>
+          <p:cNvPr id="2" name="Slide Image Placeholder 1"/>
+          <p:cNvSpPr>
+            <a:spLocks noGrp="1" noRot="1" noChangeAspect="1"/>
+          </p:cNvSpPr>
+          <p:nvPr>
+            <p:ph type="sldImg"/>
+          </p:nvPr>
+        </p:nvSpPr>
+        <p:spPr/>
+      </p:sp>
+      <p:sp>
+        <p:nvSpPr>
+          <p:cNvPr id="3" name="Notes Placeholder 2"/>
+          <p:cNvSpPr>
+            <a:spLocks noGrp="1"/>
+          </p:cNvSpPr>
+          <p:nvPr>
+            <p:ph type="body" idx="1"/>
+          </p:nvPr>
+        </p:nvSpPr>
+        <p:spPr/>
+        <p:txBody>
+          <a:bodyPr/>
+          <a:lstStyle/>
+          <a:p>
+            <a:r>
+              <a:rPr lang="en-US" altLang="zh-CN" b="1" dirty="0" smtClean="0"/>
+              <a:t>Expected: After brightness (120)</a:t>
+            </a:r>
+            <a:r>
+              <a:rPr lang="en-US" altLang="zh-CN" b="1" baseline="0" dirty="0" smtClean="0"/>
+              <a:t> and saturation (240) change, </a:t>
+            </a:r>
+            <a:r>
+              <a:rPr lang="en-US" altLang="zh-CN" b="1" baseline="0" smtClean="0"/>
+              <a:t>then apply as line color.</a:t>
+            </a:r>
+            <a:endParaRPr lang="zh-CN" altLang="en-US" b="1" dirty="0"/>
+          </a:p>
+        </p:txBody>
+      </p:sp>
+      <p:sp>
+        <p:nvSpPr>
+          <p:cNvPr id="4" name="Slide Number Placeholder 3"/>
+          <p:cNvSpPr>
+            <a:spLocks noGrp="1"/>
+          </p:cNvSpPr>
+          <p:nvPr>
+            <p:ph type="sldNum" sz="quarter" idx="10"/>
+          </p:nvPr>
+        </p:nvSpPr>
+        <p:spPr/>
+        <p:txBody>
+          <a:bodyPr/>
+          <a:lstStyle/>
+          <a:p>
+            <a:fld id="{E96FB07A-B1AD-4238-A6C9-967239C45D18}" type="slidenum">
+              <a:rPr lang="en-SG" smtClean="0"/>
+              <a:t>7</a:t>
+            </a:fld>
+            <a:endParaRPr lang="en-SG"/>
+          </a:p>
+        </p:txBody>
+      </p:sp>
+    </p:spTree>
+    <p:extLst>
+      <p:ext uri="{BB962C8B-B14F-4D97-AF65-F5344CB8AC3E}">
+        <p14:creationId xmlns:p14="http://schemas.microsoft.com/office/powerpoint/2010/main" val="1908779252"/>
+      </p:ext>
+    </p:extLst>
+  </p:cSld>
+  <p:clrMapOvr>
+    <a:masterClrMapping/>
+  </p:clrMapOvr>
+</p:notes>
+</file>
+
+<file path=ppt/notesSlides/notesSlide6.xml><?xml version="1.0" encoding="utf-8"?>
+<p:notes xmlns:a="http://schemas.openxmlformats.org/drawingml/2006/main" xmlns:r="http://schemas.openxmlformats.org/officeDocument/2006/relationships" xmlns:p="http://schemas.openxmlformats.org/presentationml/2006/main">
+  <p:cSld>
+    <p:spTree>
+      <p:nvGrpSpPr>
+        <p:cNvPr id="1" name=""/>
+        <p:cNvGrpSpPr/>
+        <p:nvPr/>
+      </p:nvGrpSpPr>
+      <p:grpSpPr>
+        <a:xfrm>
+          <a:off x="0" y="0"/>
+          <a:ext cx="0" cy="0"/>
+          <a:chOff x="0" y="0"/>
+          <a:chExt cx="0" cy="0"/>
+        </a:xfrm>
+      </p:grpSpPr>
+      <p:sp>
+        <p:nvSpPr>
+          <p:cNvPr id="2" name="Slide Image Placeholder 1"/>
+          <p:cNvSpPr>
+            <a:spLocks noGrp="1" noRot="1" noChangeAspect="1"/>
+          </p:cNvSpPr>
+          <p:nvPr>
+            <p:ph type="sldImg"/>
+          </p:nvPr>
+        </p:nvSpPr>
+        <p:spPr/>
+      </p:sp>
+      <p:sp>
+        <p:nvSpPr>
+          <p:cNvPr id="3" name="Notes Placeholder 2"/>
+          <p:cNvSpPr>
+            <a:spLocks noGrp="1"/>
+          </p:cNvSpPr>
+          <p:nvPr>
+            <p:ph type="body" idx="1"/>
+          </p:nvPr>
+        </p:nvSpPr>
+        <p:spPr/>
+        <p:txBody>
+          <a:bodyPr/>
+          <a:lstStyle/>
+          <a:p>
+            <a:r>
+              <a:rPr lang="en-US" altLang="zh-CN" b="1" dirty="0" smtClean="0"/>
+              <a:t>Expected: </a:t>
+            </a:r>
+            <a:r>
+              <a:rPr lang="en-US" altLang="zh-CN" b="1" dirty="0" smtClean="0"/>
+              <a:t>Apply monochrome1 as line, monochrome</a:t>
+            </a:r>
+            <a:r>
+              <a:rPr lang="en-US" altLang="zh-CN" b="1" baseline="0" dirty="0" smtClean="0"/>
+              <a:t> 2 as text</a:t>
+            </a:r>
+            <a:r>
+              <a:rPr lang="en-US" altLang="zh-CN" b="1" baseline="0" smtClean="0"/>
+              <a:t>, monochrome 6 as fill.</a:t>
+            </a:r>
+            <a:endParaRPr lang="zh-CN" altLang="en-US" b="1" dirty="0"/>
+          </a:p>
+        </p:txBody>
+      </p:sp>
+      <p:sp>
+        <p:nvSpPr>
+          <p:cNvPr id="4" name="Slide Number Placeholder 3"/>
+          <p:cNvSpPr>
+            <a:spLocks noGrp="1"/>
+          </p:cNvSpPr>
+          <p:nvPr>
+            <p:ph type="sldNum" sz="quarter" idx="10"/>
+          </p:nvPr>
+        </p:nvSpPr>
+        <p:spPr/>
+        <p:txBody>
+          <a:bodyPr/>
+          <a:lstStyle/>
+          <a:p>
+            <a:fld id="{E96FB07A-B1AD-4238-A6C9-967239C45D18}" type="slidenum">
+              <a:rPr lang="en-SG" smtClean="0"/>
+              <a:t>8</a:t>
+            </a:fld>
+            <a:endParaRPr lang="en-SG"/>
+          </a:p>
+        </p:txBody>
+      </p:sp>
+    </p:spTree>
+    <p:extLst>
+      <p:ext uri="{BB962C8B-B14F-4D97-AF65-F5344CB8AC3E}">
+        <p14:creationId xmlns:p14="http://schemas.microsoft.com/office/powerpoint/2010/main" val="2793821237"/>
       </p:ext>
     </p:extLst>
   </p:cSld>
@@ -970,7 +1248,7 @@
           <a:p>
             <a:fld id="{699DC775-C286-4358-8C92-D7E584E969B3}" type="datetimeFigureOut">
               <a:rPr lang="en-US" smtClean="0"/>
-              <a:t>6/21/2015</a:t>
+              <a:t>2/19/2019</a:t>
             </a:fld>
             <a:endParaRPr lang="en-US"/>
           </a:p>
@@ -1140,7 +1418,7 @@
           <a:p>
             <a:fld id="{699DC775-C286-4358-8C92-D7E584E969B3}" type="datetimeFigureOut">
               <a:rPr lang="en-US" smtClean="0"/>
-              <a:t>6/21/2015</a:t>
+              <a:t>2/19/2019</a:t>
             </a:fld>
             <a:endParaRPr lang="en-US"/>
           </a:p>
@@ -1320,7 +1598,7 @@
           <a:p>
             <a:fld id="{699DC775-C286-4358-8C92-D7E584E969B3}" type="datetimeFigureOut">
               <a:rPr lang="en-US" smtClean="0"/>
-              <a:t>6/21/2015</a:t>
+              <a:t>2/19/2019</a:t>
             </a:fld>
             <a:endParaRPr lang="en-US"/>
           </a:p>
@@ -1562,7 +1840,7 @@
           <a:p>
             <a:fld id="{699DC775-C286-4358-8C92-D7E584E969B3}" type="datetimeFigureOut">
               <a:rPr lang="en-US" smtClean="0"/>
-              <a:t>6/21/2015</a:t>
+              <a:t>2/19/2019</a:t>
             </a:fld>
             <a:endParaRPr lang="en-US"/>
           </a:p>
@@ -1732,7 +2010,7 @@
           <a:p>
             <a:fld id="{699DC775-C286-4358-8C92-D7E584E969B3}" type="datetimeFigureOut">
               <a:rPr lang="en-US" smtClean="0"/>
-              <a:t>6/21/2015</a:t>
+              <a:t>2/19/2019</a:t>
             </a:fld>
             <a:endParaRPr lang="en-US"/>
           </a:p>
@@ -1978,7 +2256,7 @@
           <a:p>
             <a:fld id="{699DC775-C286-4358-8C92-D7E584E969B3}" type="datetimeFigureOut">
               <a:rPr lang="en-US" smtClean="0"/>
-              <a:t>6/21/2015</a:t>
+              <a:t>2/19/2019</a:t>
             </a:fld>
             <a:endParaRPr lang="en-US"/>
           </a:p>
@@ -2266,7 +2544,7 @@
           <a:p>
             <a:fld id="{699DC775-C286-4358-8C92-D7E584E969B3}" type="datetimeFigureOut">
               <a:rPr lang="en-US" smtClean="0"/>
-              <a:t>6/21/2015</a:t>
+              <a:t>2/19/2019</a:t>
             </a:fld>
             <a:endParaRPr lang="en-US"/>
           </a:p>
@@ -2688,7 +2966,7 @@
           <a:p>
             <a:fld id="{699DC775-C286-4358-8C92-D7E584E969B3}" type="datetimeFigureOut">
               <a:rPr lang="en-US" smtClean="0"/>
-              <a:t>6/21/2015</a:t>
+              <a:t>2/19/2019</a:t>
             </a:fld>
             <a:endParaRPr lang="en-US"/>
           </a:p>
@@ -2806,7 +3084,7 @@
           <a:p>
             <a:fld id="{699DC775-C286-4358-8C92-D7E584E969B3}" type="datetimeFigureOut">
               <a:rPr lang="en-US" smtClean="0"/>
-              <a:t>6/21/2015</a:t>
+              <a:t>2/19/2019</a:t>
             </a:fld>
             <a:endParaRPr lang="en-US"/>
           </a:p>
@@ -2901,7 +3179,7 @@
           <a:p>
             <a:fld id="{699DC775-C286-4358-8C92-D7E584E969B3}" type="datetimeFigureOut">
               <a:rPr lang="en-US" smtClean="0"/>
-              <a:t>6/21/2015</a:t>
+              <a:t>2/19/2019</a:t>
             </a:fld>
             <a:endParaRPr lang="en-US"/>
           </a:p>
@@ -3178,7 +3456,7 @@
           <a:p>
             <a:fld id="{699DC775-C286-4358-8C92-D7E584E969B3}" type="datetimeFigureOut">
               <a:rPr lang="en-US" smtClean="0"/>
-              <a:t>6/21/2015</a:t>
+              <a:t>2/19/2019</a:t>
             </a:fld>
             <a:endParaRPr lang="en-US"/>
           </a:p>
@@ -3348,7 +3626,7 @@
           <a:p>
             <a:fld id="{699DC775-C286-4358-8C92-D7E584E969B3}" type="datetimeFigureOut">
               <a:rPr lang="en-US" smtClean="0"/>
-              <a:t>6/21/2015</a:t>
+              <a:t>2/19/2019</a:t>
             </a:fld>
             <a:endParaRPr lang="en-US"/>
           </a:p>
@@ -3601,7 +3879,7 @@
           <a:p>
             <a:fld id="{699DC775-C286-4358-8C92-D7E584E969B3}" type="datetimeFigureOut">
               <a:rPr lang="en-US" smtClean="0"/>
-              <a:t>6/21/2015</a:t>
+              <a:t>2/19/2019</a:t>
             </a:fld>
             <a:endParaRPr lang="en-US"/>
           </a:p>
@@ -3771,7 +4049,7 @@
           <a:p>
             <a:fld id="{699DC775-C286-4358-8C92-D7E584E969B3}" type="datetimeFigureOut">
               <a:rPr lang="en-US" smtClean="0"/>
-              <a:t>6/21/2015</a:t>
+              <a:t>2/19/2019</a:t>
             </a:fld>
             <a:endParaRPr lang="en-US"/>
           </a:p>
@@ -3951,7 +4229,7 @@
           <a:p>
             <a:fld id="{699DC775-C286-4358-8C92-D7E584E969B3}" type="datetimeFigureOut">
               <a:rPr lang="en-US" smtClean="0"/>
-              <a:t>6/21/2015</a:t>
+              <a:t>2/19/2019</a:t>
             </a:fld>
             <a:endParaRPr lang="en-US"/>
           </a:p>
@@ -4201,7 +4479,7 @@
           <a:p>
             <a:fld id="{699DC775-C286-4358-8C92-D7E584E969B3}" type="datetimeFigureOut">
               <a:rPr lang="en-US" smtClean="0"/>
-              <a:t>6/21/2015</a:t>
+              <a:t>2/19/2019</a:t>
             </a:fld>
             <a:endParaRPr lang="en-US"/>
           </a:p>
@@ -4379,7 +4657,7 @@
           <a:p>
             <a:fld id="{699DC775-C286-4358-8C92-D7E584E969B3}" type="datetimeFigureOut">
               <a:rPr lang="en-US" smtClean="0"/>
-              <a:t>6/21/2015</a:t>
+              <a:t>2/19/2019</a:t>
             </a:fld>
             <a:endParaRPr lang="en-US"/>
           </a:p>
@@ -4633,7 +4911,7 @@
           <a:p>
             <a:fld id="{699DC775-C286-4358-8C92-D7E584E969B3}" type="datetimeFigureOut">
               <a:rPr lang="en-US" smtClean="0"/>
-              <a:t>6/21/2015</a:t>
+              <a:t>2/19/2019</a:t>
             </a:fld>
             <a:endParaRPr lang="en-US"/>
           </a:p>
@@ -4929,7 +5207,7 @@
           <a:p>
             <a:fld id="{699DC775-C286-4358-8C92-D7E584E969B3}" type="datetimeFigureOut">
               <a:rPr lang="en-US" smtClean="0"/>
-              <a:t>6/21/2015</a:t>
+              <a:t>2/19/2019</a:t>
             </a:fld>
             <a:endParaRPr lang="en-US"/>
           </a:p>
@@ -5359,7 +5637,7 @@
           <a:p>
             <a:fld id="{699DC775-C286-4358-8C92-D7E584E969B3}" type="datetimeFigureOut">
               <a:rPr lang="en-US" smtClean="0"/>
-              <a:t>6/21/2015</a:t>
+              <a:t>2/19/2019</a:t>
             </a:fld>
             <a:endParaRPr lang="en-US"/>
           </a:p>
@@ -5485,7 +5763,7 @@
           <a:p>
             <a:fld id="{699DC775-C286-4358-8C92-D7E584E969B3}" type="datetimeFigureOut">
               <a:rPr lang="en-US" smtClean="0"/>
-              <a:t>6/21/2015</a:t>
+              <a:t>2/19/2019</a:t>
             </a:fld>
             <a:endParaRPr lang="en-US"/>
           </a:p>
@@ -5588,7 +5866,7 @@
           <a:p>
             <a:fld id="{699DC775-C286-4358-8C92-D7E584E969B3}" type="datetimeFigureOut">
               <a:rPr lang="en-US" smtClean="0"/>
-              <a:t>6/21/2015</a:t>
+              <a:t>2/19/2019</a:t>
             </a:fld>
             <a:endParaRPr lang="en-US"/>
           </a:p>
@@ -5834,7 +6112,7 @@
           <a:p>
             <a:fld id="{699DC775-C286-4358-8C92-D7E584E969B3}" type="datetimeFigureOut">
               <a:rPr lang="en-US" smtClean="0"/>
-              <a:t>6/21/2015</a:t>
+              <a:t>2/19/2019</a:t>
             </a:fld>
             <a:endParaRPr lang="en-US"/>
           </a:p>
@@ -6119,7 +6397,7 @@
           <a:p>
             <a:fld id="{699DC775-C286-4358-8C92-D7E584E969B3}" type="datetimeFigureOut">
               <a:rPr lang="en-US" smtClean="0"/>
-              <a:t>6/21/2015</a:t>
+              <a:t>2/19/2019</a:t>
             </a:fld>
             <a:endParaRPr lang="en-US"/>
           </a:p>
@@ -6380,7 +6658,7 @@
           <a:p>
             <a:fld id="{699DC775-C286-4358-8C92-D7E584E969B3}" type="datetimeFigureOut">
               <a:rPr lang="en-US" smtClean="0"/>
-              <a:t>6/21/2015</a:t>
+              <a:t>2/19/2019</a:t>
             </a:fld>
             <a:endParaRPr lang="en-US"/>
           </a:p>
@@ -6558,7 +6836,7 @@
           <a:p>
             <a:fld id="{699DC775-C286-4358-8C92-D7E584E969B3}" type="datetimeFigureOut">
               <a:rPr lang="en-US" smtClean="0"/>
-              <a:t>6/21/2015</a:t>
+              <a:t>2/19/2019</a:t>
             </a:fld>
             <a:endParaRPr lang="en-US"/>
           </a:p>
@@ -6746,7 +7024,7 @@
           <a:p>
             <a:fld id="{699DC775-C286-4358-8C92-D7E584E969B3}" type="datetimeFigureOut">
               <a:rPr lang="en-US" smtClean="0"/>
-              <a:t>6/21/2015</a:t>
+              <a:t>2/19/2019</a:t>
             </a:fld>
             <a:endParaRPr lang="en-US"/>
           </a:p>
@@ -7034,7 +7312,7 @@
           <a:p>
             <a:fld id="{699DC775-C286-4358-8C92-D7E584E969B3}" type="datetimeFigureOut">
               <a:rPr lang="en-US" smtClean="0"/>
-              <a:t>6/21/2015</a:t>
+              <a:t>2/19/2019</a:t>
             </a:fld>
             <a:endParaRPr lang="en-US"/>
           </a:p>
@@ -7456,7 +7734,7 @@
           <a:p>
             <a:fld id="{699DC775-C286-4358-8C92-D7E584E969B3}" type="datetimeFigureOut">
               <a:rPr lang="en-US" smtClean="0"/>
-              <a:t>6/21/2015</a:t>
+              <a:t>2/19/2019</a:t>
             </a:fld>
             <a:endParaRPr lang="en-US"/>
           </a:p>
@@ -7574,7 +7852,7 @@
           <a:p>
             <a:fld id="{699DC775-C286-4358-8C92-D7E584E969B3}" type="datetimeFigureOut">
               <a:rPr lang="en-US" smtClean="0"/>
-              <a:t>6/21/2015</a:t>
+              <a:t>2/19/2019</a:t>
             </a:fld>
             <a:endParaRPr lang="en-US"/>
           </a:p>
@@ -7669,7 +7947,7 @@
           <a:p>
             <a:fld id="{699DC775-C286-4358-8C92-D7E584E969B3}" type="datetimeFigureOut">
               <a:rPr lang="en-US" smtClean="0"/>
-              <a:t>6/21/2015</a:t>
+              <a:t>2/19/2019</a:t>
             </a:fld>
             <a:endParaRPr lang="en-US"/>
           </a:p>
@@ -7946,7 +8224,7 @@
           <a:p>
             <a:fld id="{699DC775-C286-4358-8C92-D7E584E969B3}" type="datetimeFigureOut">
               <a:rPr lang="en-US" smtClean="0"/>
-              <a:t>6/21/2015</a:t>
+              <a:t>2/19/2019</a:t>
             </a:fld>
             <a:endParaRPr lang="en-US"/>
           </a:p>
@@ -8199,7 +8477,7 @@
           <a:p>
             <a:fld id="{699DC775-C286-4358-8C92-D7E584E969B3}" type="datetimeFigureOut">
               <a:rPr lang="en-US" smtClean="0"/>
-              <a:t>6/21/2015</a:t>
+              <a:t>2/19/2019</a:t>
             </a:fld>
             <a:endParaRPr lang="en-US"/>
           </a:p>
@@ -8412,7 +8690,7 @@
           <a:p>
             <a:fld id="{699DC775-C286-4358-8C92-D7E584E969B3}" type="datetimeFigureOut">
               <a:rPr lang="en-US" smtClean="0"/>
-              <a:t>6/21/2015</a:t>
+              <a:t>2/19/2019</a:t>
             </a:fld>
             <a:endParaRPr lang="en-US"/>
           </a:p>
@@ -8927,7 +9205,7 @@
           <a:p>
             <a:fld id="{699DC775-C286-4358-8C92-D7E584E969B3}" type="datetimeFigureOut">
               <a:rPr lang="en-US" smtClean="0"/>
-              <a:t>6/21/2015</a:t>
+              <a:t>2/19/2019</a:t>
             </a:fld>
             <a:endParaRPr lang="en-US"/>
           </a:p>
@@ -9440,7 +9718,7 @@
           <a:p>
             <a:fld id="{699DC775-C286-4358-8C92-D7E584E969B3}" type="datetimeFigureOut">
               <a:rPr lang="en-US" smtClean="0"/>
-              <a:t>6/21/2015</a:t>
+              <a:t>2/19/2019</a:t>
             </a:fld>
             <a:endParaRPr lang="en-US"/>
           </a:p>
@@ -10443,14 +10721,7 @@
           <a:prstGeom prst="roundRect">
             <a:avLst/>
           </a:prstGeom>
-          <a:solidFill>
-            <a:srgbClr val="6194EB"/>
-          </a:solidFill>
-          <a:ln w="203200">
-            <a:solidFill>
-              <a:srgbClr val="61EB75"/>
-            </a:solidFill>
-          </a:ln>
+          <a:ln w="203200"/>
         </p:spPr>
         <p:style>
           <a:lnRef idx="2">
@@ -10476,7 +10747,7 @@
             <a:r>
               <a:rPr lang="en-US" altLang="zh-CN" sz="6600" dirty="0" smtClean="0">
                 <a:solidFill>
-                  <a:srgbClr val="EB7561"/>
+                  <a:srgbClr val="EB7662"/>
                 </a:solidFill>
                 <a:latin typeface="Times New Roman" panose="02020603050405020304" pitchFamily="18" charset="0"/>
                 <a:cs typeface="Times New Roman" panose="02020603050405020304" pitchFamily="18" charset="0"/>
@@ -10485,7 +10756,7 @@
             </a:r>
             <a:endParaRPr lang="zh-CN" altLang="en-US" sz="6600" dirty="0">
               <a:solidFill>
-                <a:srgbClr val="EB7561"/>
+                <a:srgbClr val="EB7662"/>
               </a:solidFill>
               <a:latin typeface="Times New Roman" panose="02020603050405020304" pitchFamily="18" charset="0"/>
               <a:cs typeface="Times New Roman" panose="02020603050405020304" pitchFamily="18" charset="0"/>
@@ -10495,7 +10766,7 @@
       </p:sp>
       <p:sp>
         <p:nvSpPr>
-          <p:cNvPr id="5" name="Rounded Rectangle 4"/>
+          <p:cNvPr id="6" name="fontColor"/>
           <p:cNvSpPr/>
           <p:nvPr/>
         </p:nvSpPr>
@@ -10541,7 +10812,7 @@
       </p:sp>
       <p:sp>
         <p:nvSpPr>
-          <p:cNvPr id="7" name="Rounded Rectangle 6"/>
+          <p:cNvPr id="9" name="lineColor"/>
           <p:cNvSpPr/>
           <p:nvPr/>
         </p:nvSpPr>
@@ -10587,7 +10858,7 @@
       </p:sp>
       <p:sp>
         <p:nvSpPr>
-          <p:cNvPr id="8" name="Rounded Rectangle 7"/>
+          <p:cNvPr id="10" name="fillColor"/>
           <p:cNvSpPr/>
           <p:nvPr/>
         </p:nvSpPr>
@@ -10633,7 +10904,7 @@
       </p:sp>
       <p:sp>
         <p:nvSpPr>
-          <p:cNvPr id="9" name="TextBox 8"/>
+          <p:cNvPr id="11" name="TextBox 8"/>
           <p:cNvSpPr txBox="1"/>
           <p:nvPr/>
         </p:nvSpPr>
@@ -10663,7 +10934,7 @@
       </p:sp>
       <p:sp>
         <p:nvSpPr>
-          <p:cNvPr id="10" name="TextBox 9"/>
+          <p:cNvPr id="12" name="TextBox 9"/>
           <p:cNvSpPr txBox="1"/>
           <p:nvPr/>
         </p:nvSpPr>
@@ -10699,7 +10970,7 @@
       </p:sp>
       <p:sp>
         <p:nvSpPr>
-          <p:cNvPr id="11" name="TextBox 10"/>
+          <p:cNvPr id="13" name="TextBox 10"/>
           <p:cNvSpPr txBox="1"/>
           <p:nvPr/>
         </p:nvSpPr>
@@ -10730,7 +11001,7 @@
     </p:spTree>
     <p:extLst>
       <p:ext uri="{BB962C8B-B14F-4D97-AF65-F5344CB8AC3E}">
-        <p14:creationId xmlns:p14="http://schemas.microsoft.com/office/powerpoint/2010/main" val="3976109174"/>
+        <p14:creationId xmlns:p14="http://schemas.microsoft.com/office/powerpoint/2010/main" val="2028946117"/>
       </p:ext>
     </p:extLst>
   </p:cSld>
@@ -10779,12 +11050,9 @@
           <a:prstGeom prst="roundRect">
             <a:avLst/>
           </a:prstGeom>
-          <a:solidFill>
-            <a:srgbClr val="0A275A"/>
-          </a:solidFill>
           <a:ln w="203200">
             <a:solidFill>
-              <a:srgbClr val="61EB75"/>
+              <a:srgbClr val="62EB76"/>
             </a:solidFill>
           </a:ln>
         </p:spPr>
@@ -10812,7 +11080,7 @@
             <a:r>
               <a:rPr lang="en-US" altLang="zh-CN" sz="6600" dirty="0" smtClean="0">
                 <a:solidFill>
-                  <a:srgbClr val="EB7561"/>
+                  <a:srgbClr val="EB7662"/>
                 </a:solidFill>
                 <a:latin typeface="Times New Roman" panose="02020603050405020304" pitchFamily="18" charset="0"/>
                 <a:cs typeface="Times New Roman" panose="02020603050405020304" pitchFamily="18" charset="0"/>
@@ -10821,7 +11089,7 @@
             </a:r>
             <a:endParaRPr lang="zh-CN" altLang="en-US" sz="6600" dirty="0">
               <a:solidFill>
-                <a:srgbClr val="EB7561"/>
+                <a:srgbClr val="EB7662"/>
               </a:solidFill>
               <a:latin typeface="Times New Roman" panose="02020603050405020304" pitchFamily="18" charset="0"/>
               <a:cs typeface="Times New Roman" panose="02020603050405020304" pitchFamily="18" charset="0"/>
@@ -10831,7 +11099,7 @@
       </p:sp>
       <p:sp>
         <p:nvSpPr>
-          <p:cNvPr id="5" name="Rounded Rectangle 4"/>
+          <p:cNvPr id="6" name="fontColor"/>
           <p:cNvSpPr/>
           <p:nvPr/>
         </p:nvSpPr>
@@ -10877,7 +11145,7 @@
       </p:sp>
       <p:sp>
         <p:nvSpPr>
-          <p:cNvPr id="7" name="Rounded Rectangle 6"/>
+          <p:cNvPr id="9" name="lineColor"/>
           <p:cNvSpPr/>
           <p:nvPr/>
         </p:nvSpPr>
@@ -10923,7 +11191,7 @@
       </p:sp>
       <p:sp>
         <p:nvSpPr>
-          <p:cNvPr id="8" name="Rounded Rectangle 7"/>
+          <p:cNvPr id="10" name="fillColor"/>
           <p:cNvSpPr/>
           <p:nvPr/>
         </p:nvSpPr>
@@ -10969,7 +11237,7 @@
       </p:sp>
       <p:sp>
         <p:nvSpPr>
-          <p:cNvPr id="9" name="TextBox 8"/>
+          <p:cNvPr id="11" name="TextBox 8"/>
           <p:cNvSpPr txBox="1"/>
           <p:nvPr/>
         </p:nvSpPr>
@@ -10999,7 +11267,7 @@
       </p:sp>
       <p:sp>
         <p:nvSpPr>
-          <p:cNvPr id="10" name="TextBox 9"/>
+          <p:cNvPr id="12" name="TextBox 9"/>
           <p:cNvSpPr txBox="1"/>
           <p:nvPr/>
         </p:nvSpPr>
@@ -11035,7 +11303,7 @@
       </p:sp>
       <p:sp>
         <p:nvSpPr>
-          <p:cNvPr id="11" name="TextBox 10"/>
+          <p:cNvPr id="13" name="TextBox 10"/>
           <p:cNvSpPr txBox="1"/>
           <p:nvPr/>
         </p:nvSpPr>
@@ -11066,7 +11334,7 @@
     </p:spTree>
     <p:extLst>
       <p:ext uri="{BB962C8B-B14F-4D97-AF65-F5344CB8AC3E}">
-        <p14:creationId xmlns:p14="http://schemas.microsoft.com/office/powerpoint/2010/main" val="4157521938"/>
+        <p14:creationId xmlns:p14="http://schemas.microsoft.com/office/powerpoint/2010/main" val="4226198030"/>
       </p:ext>
     </p:extLst>
   </p:cSld>
@@ -11077,6 +11345,1014 @@
 </file>
 
 <file path=ppt/slides/slide6.xml><?xml version="1.0" encoding="utf-8"?>
+<p:sld xmlns:a="http://schemas.openxmlformats.org/drawingml/2006/main" xmlns:r="http://schemas.openxmlformats.org/officeDocument/2006/relationships" xmlns:p="http://schemas.openxmlformats.org/presentationml/2006/main">
+  <p:cSld>
+    <p:bg>
+      <p:bgPr>
+        <a:solidFill>
+          <a:schemeClr val="bg1"/>
+        </a:solidFill>
+        <a:effectLst/>
+      </p:bgPr>
+    </p:bg>
+    <p:spTree>
+      <p:nvGrpSpPr>
+        <p:cNvPr id="1" name=""/>
+        <p:cNvGrpSpPr/>
+        <p:nvPr/>
+      </p:nvGrpSpPr>
+      <p:grpSpPr>
+        <a:xfrm>
+          <a:off x="0" y="0"/>
+          <a:ext cx="0" cy="0"/>
+          <a:chOff x="0" y="0"/>
+          <a:chExt cx="0" cy="0"/>
+        </a:xfrm>
+      </p:grpSpPr>
+      <p:sp>
+        <p:nvSpPr>
+          <p:cNvPr id="3" name="selectMe"/>
+          <p:cNvSpPr/>
+          <p:nvPr/>
+        </p:nvSpPr>
+        <p:spPr>
+          <a:xfrm>
+            <a:off x="1524000" y="990600"/>
+            <a:ext cx="2743200" cy="4572000"/>
+          </a:xfrm>
+          <a:prstGeom prst="roundRect">
+            <a:avLst/>
+          </a:prstGeom>
+          <a:solidFill>
+            <a:srgbClr val="6294EB"/>
+          </a:solidFill>
+          <a:ln w="203200">
+            <a:solidFill>
+              <a:srgbClr val="62EB76"/>
+            </a:solidFill>
+          </a:ln>
+        </p:spPr>
+        <p:style>
+          <a:lnRef idx="2">
+            <a:schemeClr val="accent1">
+              <a:shade val="50000"/>
+            </a:schemeClr>
+          </a:lnRef>
+          <a:fillRef idx="1">
+            <a:schemeClr val="accent1"/>
+          </a:fillRef>
+          <a:effectRef idx="0">
+            <a:schemeClr val="accent1"/>
+          </a:effectRef>
+          <a:fontRef idx="minor">
+            <a:schemeClr val="lt1"/>
+          </a:fontRef>
+        </p:style>
+        <p:txBody>
+          <a:bodyPr rtlCol="0" anchor="ctr"/>
+          <a:lstStyle/>
+          <a:p>
+            <a:pPr algn="ctr"/>
+            <a:r>
+              <a:rPr lang="en-US" altLang="zh-CN" sz="6600" dirty="0" smtClean="0">
+                <a:solidFill>
+                  <a:srgbClr val="EB7662"/>
+                </a:solidFill>
+                <a:latin typeface="Times New Roman" panose="02020603050405020304" pitchFamily="18" charset="0"/>
+                <a:cs typeface="Times New Roman" panose="02020603050405020304" pitchFamily="18" charset="0"/>
+              </a:rPr>
+              <a:t>TEXT</a:t>
+            </a:r>
+            <a:endParaRPr lang="zh-CN" altLang="en-US" sz="6600" dirty="0">
+              <a:solidFill>
+                <a:srgbClr val="EB7662"/>
+              </a:solidFill>
+              <a:latin typeface="Times New Roman" panose="02020603050405020304" pitchFamily="18" charset="0"/>
+              <a:cs typeface="Times New Roman" panose="02020603050405020304" pitchFamily="18" charset="0"/>
+            </a:endParaRPr>
+          </a:p>
+        </p:txBody>
+      </p:sp>
+      <p:sp>
+        <p:nvSpPr>
+          <p:cNvPr id="6" name="fontColor"/>
+          <p:cNvSpPr/>
+          <p:nvPr/>
+        </p:nvSpPr>
+        <p:spPr>
+          <a:xfrm>
+            <a:off x="5867400" y="1219200"/>
+            <a:ext cx="1828800" cy="1295400"/>
+          </a:xfrm>
+          <a:prstGeom prst="roundRect">
+            <a:avLst/>
+          </a:prstGeom>
+          <a:solidFill>
+            <a:srgbClr val="EB7662"/>
+          </a:solidFill>
+          <a:ln>
+            <a:noFill/>
+          </a:ln>
+        </p:spPr>
+        <p:style>
+          <a:lnRef idx="2">
+            <a:schemeClr val="accent1">
+              <a:shade val="50000"/>
+            </a:schemeClr>
+          </a:lnRef>
+          <a:fillRef idx="1">
+            <a:schemeClr val="accent1"/>
+          </a:fillRef>
+          <a:effectRef idx="0">
+            <a:schemeClr val="accent1"/>
+          </a:effectRef>
+          <a:fontRef idx="minor">
+            <a:schemeClr val="lt1"/>
+          </a:fontRef>
+        </p:style>
+        <p:txBody>
+          <a:bodyPr rtlCol="0" anchor="ctr"/>
+          <a:lstStyle/>
+          <a:p>
+            <a:pPr algn="ctr"/>
+            <a:endParaRPr lang="zh-CN" altLang="en-US"/>
+          </a:p>
+        </p:txBody>
+      </p:sp>
+      <p:sp>
+        <p:nvSpPr>
+          <p:cNvPr id="9" name="lineColor"/>
+          <p:cNvSpPr/>
+          <p:nvPr/>
+        </p:nvSpPr>
+        <p:spPr>
+          <a:xfrm>
+            <a:off x="5867400" y="2743200"/>
+            <a:ext cx="1828800" cy="1295400"/>
+          </a:xfrm>
+          <a:prstGeom prst="roundRect">
+            <a:avLst/>
+          </a:prstGeom>
+          <a:solidFill>
+            <a:srgbClr val="62EB76"/>
+          </a:solidFill>
+          <a:ln>
+            <a:noFill/>
+          </a:ln>
+        </p:spPr>
+        <p:style>
+          <a:lnRef idx="2">
+            <a:schemeClr val="accent1">
+              <a:shade val="50000"/>
+            </a:schemeClr>
+          </a:lnRef>
+          <a:fillRef idx="1">
+            <a:schemeClr val="accent1"/>
+          </a:fillRef>
+          <a:effectRef idx="0">
+            <a:schemeClr val="accent1"/>
+          </a:effectRef>
+          <a:fontRef idx="minor">
+            <a:schemeClr val="lt1"/>
+          </a:fontRef>
+        </p:style>
+        <p:txBody>
+          <a:bodyPr rtlCol="0" anchor="ctr"/>
+          <a:lstStyle/>
+          <a:p>
+            <a:pPr algn="ctr"/>
+            <a:endParaRPr lang="zh-CN" altLang="en-US"/>
+          </a:p>
+        </p:txBody>
+      </p:sp>
+      <p:sp>
+        <p:nvSpPr>
+          <p:cNvPr id="10" name="fillColor"/>
+          <p:cNvSpPr/>
+          <p:nvPr/>
+        </p:nvSpPr>
+        <p:spPr>
+          <a:xfrm>
+            <a:off x="5867400" y="4267200"/>
+            <a:ext cx="1828800" cy="1295400"/>
+          </a:xfrm>
+          <a:prstGeom prst="roundRect">
+            <a:avLst/>
+          </a:prstGeom>
+          <a:solidFill>
+            <a:srgbClr val="6294EB"/>
+          </a:solidFill>
+          <a:ln>
+            <a:noFill/>
+          </a:ln>
+        </p:spPr>
+        <p:style>
+          <a:lnRef idx="2">
+            <a:schemeClr val="accent1">
+              <a:shade val="50000"/>
+            </a:schemeClr>
+          </a:lnRef>
+          <a:fillRef idx="1">
+            <a:schemeClr val="accent1"/>
+          </a:fillRef>
+          <a:effectRef idx="0">
+            <a:schemeClr val="accent1"/>
+          </a:effectRef>
+          <a:fontRef idx="minor">
+            <a:schemeClr val="lt1"/>
+          </a:fontRef>
+        </p:style>
+        <p:txBody>
+          <a:bodyPr rtlCol="0" anchor="ctr"/>
+          <a:lstStyle/>
+          <a:p>
+            <a:pPr algn="ctr"/>
+            <a:endParaRPr lang="zh-CN" altLang="en-US"/>
+          </a:p>
+        </p:txBody>
+      </p:sp>
+      <p:sp>
+        <p:nvSpPr>
+          <p:cNvPr id="11" name="TextBox 8"/>
+          <p:cNvSpPr txBox="1"/>
+          <p:nvPr/>
+        </p:nvSpPr>
+        <p:spPr>
+          <a:xfrm>
+            <a:off x="7848600" y="1682234"/>
+            <a:ext cx="1131272" cy="369332"/>
+          </a:xfrm>
+          <a:prstGeom prst="rect">
+            <a:avLst/>
+          </a:prstGeom>
+          <a:noFill/>
+        </p:spPr>
+        <p:txBody>
+          <a:bodyPr wrap="none" rtlCol="0">
+            <a:spAutoFit/>
+          </a:bodyPr>
+          <a:lstStyle/>
+          <a:p>
+            <a:r>
+              <a:rPr lang="en-US" altLang="zh-CN" dirty="0" smtClean="0"/>
+              <a:t>Font color</a:t>
+            </a:r>
+            <a:endParaRPr lang="zh-CN" altLang="en-US" dirty="0"/>
+          </a:p>
+        </p:txBody>
+      </p:sp>
+      <p:sp>
+        <p:nvSpPr>
+          <p:cNvPr id="12" name="TextBox 9"/>
+          <p:cNvSpPr txBox="1"/>
+          <p:nvPr/>
+        </p:nvSpPr>
+        <p:spPr>
+          <a:xfrm>
+            <a:off x="7974852" y="3067734"/>
+            <a:ext cx="878767" cy="646331"/>
+          </a:xfrm>
+          <a:prstGeom prst="rect">
+            <a:avLst/>
+          </a:prstGeom>
+          <a:noFill/>
+        </p:spPr>
+        <p:txBody>
+          <a:bodyPr wrap="none" rtlCol="0">
+            <a:spAutoFit/>
+          </a:bodyPr>
+          <a:lstStyle/>
+          <a:p>
+            <a:r>
+              <a:rPr lang="en-US" altLang="zh-CN" dirty="0" smtClean="0"/>
+              <a:t>Outline</a:t>
+            </a:r>
+          </a:p>
+          <a:p>
+            <a:r>
+              <a:rPr lang="en-US" altLang="zh-CN" dirty="0" smtClean="0"/>
+              <a:t>color</a:t>
+            </a:r>
+            <a:endParaRPr lang="zh-CN" altLang="en-US" dirty="0"/>
+          </a:p>
+        </p:txBody>
+      </p:sp>
+      <p:sp>
+        <p:nvSpPr>
+          <p:cNvPr id="13" name="TextBox 10"/>
+          <p:cNvSpPr txBox="1"/>
+          <p:nvPr/>
+        </p:nvSpPr>
+        <p:spPr>
+          <a:xfrm>
+            <a:off x="7861300" y="4700199"/>
+            <a:ext cx="974626" cy="369332"/>
+          </a:xfrm>
+          <a:prstGeom prst="rect">
+            <a:avLst/>
+          </a:prstGeom>
+          <a:noFill/>
+        </p:spPr>
+        <p:txBody>
+          <a:bodyPr wrap="none" rtlCol="0">
+            <a:spAutoFit/>
+          </a:bodyPr>
+          <a:lstStyle/>
+          <a:p>
+            <a:r>
+              <a:rPr lang="en-US" altLang="zh-CN" dirty="0" smtClean="0"/>
+              <a:t>Fill color</a:t>
+            </a:r>
+            <a:endParaRPr lang="zh-CN" altLang="en-US" dirty="0"/>
+          </a:p>
+        </p:txBody>
+      </p:sp>
+    </p:spTree>
+    <p:extLst>
+      <p:ext uri="{BB962C8B-B14F-4D97-AF65-F5344CB8AC3E}">
+        <p14:creationId xmlns:p14="http://schemas.microsoft.com/office/powerpoint/2010/main" val="2634508980"/>
+      </p:ext>
+    </p:extLst>
+  </p:cSld>
+  <p:clrMapOvr>
+    <a:masterClrMapping/>
+  </p:clrMapOvr>
+</p:sld>
+</file>
+
+<file path=ppt/slides/slide7.xml><?xml version="1.0" encoding="utf-8"?>
+<p:sld xmlns:a="http://schemas.openxmlformats.org/drawingml/2006/main" xmlns:r="http://schemas.openxmlformats.org/officeDocument/2006/relationships" xmlns:p="http://schemas.openxmlformats.org/presentationml/2006/main">
+  <p:cSld>
+    <p:bg>
+      <p:bgPr>
+        <a:solidFill>
+          <a:schemeClr val="bg1"/>
+        </a:solidFill>
+        <a:effectLst/>
+      </p:bgPr>
+    </p:bg>
+    <p:spTree>
+      <p:nvGrpSpPr>
+        <p:cNvPr id="1" name=""/>
+        <p:cNvGrpSpPr/>
+        <p:nvPr/>
+      </p:nvGrpSpPr>
+      <p:grpSpPr>
+        <a:xfrm>
+          <a:off x="0" y="0"/>
+          <a:ext cx="0" cy="0"/>
+          <a:chOff x="0" y="0"/>
+          <a:chExt cx="0" cy="0"/>
+        </a:xfrm>
+      </p:grpSpPr>
+      <p:sp>
+        <p:nvSpPr>
+          <p:cNvPr id="3" name="selectMe"/>
+          <p:cNvSpPr/>
+          <p:nvPr/>
+        </p:nvSpPr>
+        <p:spPr>
+          <a:xfrm>
+            <a:off x="1524000" y="990600"/>
+            <a:ext cx="2743200" cy="4572000"/>
+          </a:xfrm>
+          <a:prstGeom prst="roundRect">
+            <a:avLst/>
+          </a:prstGeom>
+          <a:solidFill>
+            <a:srgbClr val="6294EB"/>
+          </a:solidFill>
+          <a:ln w="203200">
+            <a:solidFill>
+              <a:srgbClr val="0059FF"/>
+            </a:solidFill>
+          </a:ln>
+        </p:spPr>
+        <p:style>
+          <a:lnRef idx="2">
+            <a:schemeClr val="accent1">
+              <a:shade val="50000"/>
+            </a:schemeClr>
+          </a:lnRef>
+          <a:fillRef idx="1">
+            <a:schemeClr val="accent1"/>
+          </a:fillRef>
+          <a:effectRef idx="0">
+            <a:schemeClr val="accent1"/>
+          </a:effectRef>
+          <a:fontRef idx="minor">
+            <a:schemeClr val="lt1"/>
+          </a:fontRef>
+        </p:style>
+        <p:txBody>
+          <a:bodyPr rtlCol="0" anchor="ctr"/>
+          <a:lstStyle/>
+          <a:p>
+            <a:pPr algn="ctr"/>
+            <a:r>
+              <a:rPr lang="en-US" altLang="zh-CN" sz="6600" dirty="0" smtClean="0">
+                <a:solidFill>
+                  <a:srgbClr val="EB7662"/>
+                </a:solidFill>
+                <a:latin typeface="Times New Roman" panose="02020603050405020304" pitchFamily="18" charset="0"/>
+                <a:cs typeface="Times New Roman" panose="02020603050405020304" pitchFamily="18" charset="0"/>
+              </a:rPr>
+              <a:t>TEXT</a:t>
+            </a:r>
+            <a:endParaRPr lang="zh-CN" altLang="en-US" sz="6600" dirty="0">
+              <a:solidFill>
+                <a:srgbClr val="EB7662"/>
+              </a:solidFill>
+              <a:latin typeface="Times New Roman" panose="02020603050405020304" pitchFamily="18" charset="0"/>
+              <a:cs typeface="Times New Roman" panose="02020603050405020304" pitchFamily="18" charset="0"/>
+            </a:endParaRPr>
+          </a:p>
+        </p:txBody>
+      </p:sp>
+      <p:sp>
+        <p:nvSpPr>
+          <p:cNvPr id="6" name="fontColor"/>
+          <p:cNvSpPr/>
+          <p:nvPr/>
+        </p:nvSpPr>
+        <p:spPr>
+          <a:xfrm>
+            <a:off x="5867400" y="1219200"/>
+            <a:ext cx="1828800" cy="1295400"/>
+          </a:xfrm>
+          <a:prstGeom prst="roundRect">
+            <a:avLst/>
+          </a:prstGeom>
+          <a:solidFill>
+            <a:srgbClr val="EB7662"/>
+          </a:solidFill>
+          <a:ln>
+            <a:noFill/>
+          </a:ln>
+        </p:spPr>
+        <p:style>
+          <a:lnRef idx="2">
+            <a:schemeClr val="accent1">
+              <a:shade val="50000"/>
+            </a:schemeClr>
+          </a:lnRef>
+          <a:fillRef idx="1">
+            <a:schemeClr val="accent1"/>
+          </a:fillRef>
+          <a:effectRef idx="0">
+            <a:schemeClr val="accent1"/>
+          </a:effectRef>
+          <a:fontRef idx="minor">
+            <a:schemeClr val="lt1"/>
+          </a:fontRef>
+        </p:style>
+        <p:txBody>
+          <a:bodyPr rtlCol="0" anchor="ctr"/>
+          <a:lstStyle/>
+          <a:p>
+            <a:pPr algn="ctr"/>
+            <a:endParaRPr lang="zh-CN" altLang="en-US"/>
+          </a:p>
+        </p:txBody>
+      </p:sp>
+      <p:sp>
+        <p:nvSpPr>
+          <p:cNvPr id="9" name="lineColor"/>
+          <p:cNvSpPr/>
+          <p:nvPr/>
+        </p:nvSpPr>
+        <p:spPr>
+          <a:xfrm>
+            <a:off x="5867400" y="2743200"/>
+            <a:ext cx="1828800" cy="1295400"/>
+          </a:xfrm>
+          <a:prstGeom prst="roundRect">
+            <a:avLst/>
+          </a:prstGeom>
+          <a:solidFill>
+            <a:srgbClr val="62EB76"/>
+          </a:solidFill>
+          <a:ln>
+            <a:noFill/>
+          </a:ln>
+        </p:spPr>
+        <p:style>
+          <a:lnRef idx="2">
+            <a:schemeClr val="accent1">
+              <a:shade val="50000"/>
+            </a:schemeClr>
+          </a:lnRef>
+          <a:fillRef idx="1">
+            <a:schemeClr val="accent1"/>
+          </a:fillRef>
+          <a:effectRef idx="0">
+            <a:schemeClr val="accent1"/>
+          </a:effectRef>
+          <a:fontRef idx="minor">
+            <a:schemeClr val="lt1"/>
+          </a:fontRef>
+        </p:style>
+        <p:txBody>
+          <a:bodyPr rtlCol="0" anchor="ctr"/>
+          <a:lstStyle/>
+          <a:p>
+            <a:pPr algn="ctr"/>
+            <a:endParaRPr lang="zh-CN" altLang="en-US"/>
+          </a:p>
+        </p:txBody>
+      </p:sp>
+      <p:sp>
+        <p:nvSpPr>
+          <p:cNvPr id="10" name="fillColor"/>
+          <p:cNvSpPr/>
+          <p:nvPr/>
+        </p:nvSpPr>
+        <p:spPr>
+          <a:xfrm>
+            <a:off x="5867400" y="4267200"/>
+            <a:ext cx="1828800" cy="1295400"/>
+          </a:xfrm>
+          <a:prstGeom prst="roundRect">
+            <a:avLst/>
+          </a:prstGeom>
+          <a:solidFill>
+            <a:srgbClr val="6294EB"/>
+          </a:solidFill>
+          <a:ln>
+            <a:noFill/>
+          </a:ln>
+        </p:spPr>
+        <p:style>
+          <a:lnRef idx="2">
+            <a:schemeClr val="accent1">
+              <a:shade val="50000"/>
+            </a:schemeClr>
+          </a:lnRef>
+          <a:fillRef idx="1">
+            <a:schemeClr val="accent1"/>
+          </a:fillRef>
+          <a:effectRef idx="0">
+            <a:schemeClr val="accent1"/>
+          </a:effectRef>
+          <a:fontRef idx="minor">
+            <a:schemeClr val="lt1"/>
+          </a:fontRef>
+        </p:style>
+        <p:txBody>
+          <a:bodyPr rtlCol="0" anchor="ctr"/>
+          <a:lstStyle/>
+          <a:p>
+            <a:pPr algn="ctr"/>
+            <a:endParaRPr lang="zh-CN" altLang="en-US"/>
+          </a:p>
+        </p:txBody>
+      </p:sp>
+      <p:sp>
+        <p:nvSpPr>
+          <p:cNvPr id="11" name="TextBox 8"/>
+          <p:cNvSpPr txBox="1"/>
+          <p:nvPr/>
+        </p:nvSpPr>
+        <p:spPr>
+          <a:xfrm>
+            <a:off x="7848600" y="1682234"/>
+            <a:ext cx="1131272" cy="369332"/>
+          </a:xfrm>
+          <a:prstGeom prst="rect">
+            <a:avLst/>
+          </a:prstGeom>
+          <a:noFill/>
+        </p:spPr>
+        <p:txBody>
+          <a:bodyPr wrap="none" rtlCol="0">
+            <a:spAutoFit/>
+          </a:bodyPr>
+          <a:lstStyle/>
+          <a:p>
+            <a:r>
+              <a:rPr lang="en-US" altLang="zh-CN" dirty="0" smtClean="0"/>
+              <a:t>Font color</a:t>
+            </a:r>
+            <a:endParaRPr lang="zh-CN" altLang="en-US" dirty="0"/>
+          </a:p>
+        </p:txBody>
+      </p:sp>
+      <p:sp>
+        <p:nvSpPr>
+          <p:cNvPr id="12" name="TextBox 9"/>
+          <p:cNvSpPr txBox="1"/>
+          <p:nvPr/>
+        </p:nvSpPr>
+        <p:spPr>
+          <a:xfrm>
+            <a:off x="7974852" y="3067734"/>
+            <a:ext cx="878767" cy="646331"/>
+          </a:xfrm>
+          <a:prstGeom prst="rect">
+            <a:avLst/>
+          </a:prstGeom>
+          <a:noFill/>
+        </p:spPr>
+        <p:txBody>
+          <a:bodyPr wrap="none" rtlCol="0">
+            <a:spAutoFit/>
+          </a:bodyPr>
+          <a:lstStyle/>
+          <a:p>
+            <a:r>
+              <a:rPr lang="en-US" altLang="zh-CN" dirty="0" smtClean="0"/>
+              <a:t>Outline</a:t>
+            </a:r>
+          </a:p>
+          <a:p>
+            <a:r>
+              <a:rPr lang="en-US" altLang="zh-CN" dirty="0" smtClean="0"/>
+              <a:t>color</a:t>
+            </a:r>
+            <a:endParaRPr lang="zh-CN" altLang="en-US" dirty="0"/>
+          </a:p>
+        </p:txBody>
+      </p:sp>
+      <p:sp>
+        <p:nvSpPr>
+          <p:cNvPr id="13" name="TextBox 10"/>
+          <p:cNvSpPr txBox="1"/>
+          <p:nvPr/>
+        </p:nvSpPr>
+        <p:spPr>
+          <a:xfrm>
+            <a:off x="7861300" y="4700199"/>
+            <a:ext cx="974626" cy="369332"/>
+          </a:xfrm>
+          <a:prstGeom prst="rect">
+            <a:avLst/>
+          </a:prstGeom>
+          <a:noFill/>
+        </p:spPr>
+        <p:txBody>
+          <a:bodyPr wrap="none" rtlCol="0">
+            <a:spAutoFit/>
+          </a:bodyPr>
+          <a:lstStyle/>
+          <a:p>
+            <a:r>
+              <a:rPr lang="en-US" altLang="zh-CN" dirty="0" smtClean="0"/>
+              <a:t>Fill color</a:t>
+            </a:r>
+            <a:endParaRPr lang="zh-CN" altLang="en-US" dirty="0"/>
+          </a:p>
+        </p:txBody>
+      </p:sp>
+    </p:spTree>
+    <p:extLst>
+      <p:ext uri="{BB962C8B-B14F-4D97-AF65-F5344CB8AC3E}">
+        <p14:creationId xmlns:p14="http://schemas.microsoft.com/office/powerpoint/2010/main" val="1834753234"/>
+      </p:ext>
+    </p:extLst>
+  </p:cSld>
+  <p:clrMapOvr>
+    <a:masterClrMapping/>
+  </p:clrMapOvr>
+</p:sld>
+</file>
+
+<file path=ppt/slides/slide8.xml><?xml version="1.0" encoding="utf-8"?>
+<p:sld xmlns:a="http://schemas.openxmlformats.org/drawingml/2006/main" xmlns:r="http://schemas.openxmlformats.org/officeDocument/2006/relationships" xmlns:p="http://schemas.openxmlformats.org/presentationml/2006/main">
+  <p:cSld>
+    <p:bg>
+      <p:bgPr>
+        <a:solidFill>
+          <a:schemeClr val="bg1"/>
+        </a:solidFill>
+        <a:effectLst/>
+      </p:bgPr>
+    </p:bg>
+    <p:spTree>
+      <p:nvGrpSpPr>
+        <p:cNvPr id="1" name=""/>
+        <p:cNvGrpSpPr/>
+        <p:nvPr/>
+      </p:nvGrpSpPr>
+      <p:grpSpPr>
+        <a:xfrm>
+          <a:off x="0" y="0"/>
+          <a:ext cx="0" cy="0"/>
+          <a:chOff x="0" y="0"/>
+          <a:chExt cx="0" cy="0"/>
+        </a:xfrm>
+      </p:grpSpPr>
+      <p:sp>
+        <p:nvSpPr>
+          <p:cNvPr id="3" name="selectMe"/>
+          <p:cNvSpPr/>
+          <p:nvPr/>
+        </p:nvSpPr>
+        <p:spPr>
+          <a:xfrm>
+            <a:off x="1524000" y="990600"/>
+            <a:ext cx="2743200" cy="4572000"/>
+          </a:xfrm>
+          <a:prstGeom prst="roundRect">
+            <a:avLst/>
+          </a:prstGeom>
+          <a:solidFill>
+            <a:srgbClr val="103B89"/>
+          </a:solidFill>
+          <a:ln w="203200">
+            <a:solidFill>
+              <a:srgbClr val="A4C1F4"/>
+            </a:solidFill>
+          </a:ln>
+        </p:spPr>
+        <p:style>
+          <a:lnRef idx="2">
+            <a:schemeClr val="accent1">
+              <a:shade val="50000"/>
+            </a:schemeClr>
+          </a:lnRef>
+          <a:fillRef idx="1">
+            <a:schemeClr val="accent1"/>
+          </a:fillRef>
+          <a:effectRef idx="0">
+            <a:schemeClr val="accent1"/>
+          </a:effectRef>
+          <a:fontRef idx="minor">
+            <a:schemeClr val="lt1"/>
+          </a:fontRef>
+        </p:style>
+        <p:txBody>
+          <a:bodyPr rtlCol="0" anchor="ctr"/>
+          <a:lstStyle/>
+          <a:p>
+            <a:pPr algn="ctr"/>
+            <a:r>
+              <a:rPr lang="en-US" altLang="zh-CN" sz="6600" dirty="0" smtClean="0">
+                <a:solidFill>
+                  <a:srgbClr val="76A1EF"/>
+                </a:solidFill>
+                <a:latin typeface="Times New Roman" panose="02020603050405020304" pitchFamily="18" charset="0"/>
+                <a:cs typeface="Times New Roman" panose="02020603050405020304" pitchFamily="18" charset="0"/>
+              </a:rPr>
+              <a:t>TEXT</a:t>
+            </a:r>
+            <a:endParaRPr lang="zh-CN" altLang="en-US" sz="6600" dirty="0">
+              <a:solidFill>
+                <a:srgbClr val="76A1EF"/>
+              </a:solidFill>
+              <a:latin typeface="Times New Roman" panose="02020603050405020304" pitchFamily="18" charset="0"/>
+              <a:cs typeface="Times New Roman" panose="02020603050405020304" pitchFamily="18" charset="0"/>
+            </a:endParaRPr>
+          </a:p>
+        </p:txBody>
+      </p:sp>
+      <p:sp>
+        <p:nvSpPr>
+          <p:cNvPr id="6" name="fontColor"/>
+          <p:cNvSpPr/>
+          <p:nvPr/>
+        </p:nvSpPr>
+        <p:spPr>
+          <a:xfrm>
+            <a:off x="5867400" y="1219200"/>
+            <a:ext cx="1828800" cy="1295400"/>
+          </a:xfrm>
+          <a:prstGeom prst="roundRect">
+            <a:avLst/>
+          </a:prstGeom>
+          <a:solidFill>
+            <a:srgbClr val="EB7662"/>
+          </a:solidFill>
+          <a:ln>
+            <a:noFill/>
+          </a:ln>
+        </p:spPr>
+        <p:style>
+          <a:lnRef idx="2">
+            <a:schemeClr val="accent1">
+              <a:shade val="50000"/>
+            </a:schemeClr>
+          </a:lnRef>
+          <a:fillRef idx="1">
+            <a:schemeClr val="accent1"/>
+          </a:fillRef>
+          <a:effectRef idx="0">
+            <a:schemeClr val="accent1"/>
+          </a:effectRef>
+          <a:fontRef idx="minor">
+            <a:schemeClr val="lt1"/>
+          </a:fontRef>
+        </p:style>
+        <p:txBody>
+          <a:bodyPr rtlCol="0" anchor="ctr"/>
+          <a:lstStyle/>
+          <a:p>
+            <a:pPr algn="ctr"/>
+            <a:endParaRPr lang="zh-CN" altLang="en-US"/>
+          </a:p>
+        </p:txBody>
+      </p:sp>
+      <p:sp>
+        <p:nvSpPr>
+          <p:cNvPr id="9" name="lineColor"/>
+          <p:cNvSpPr/>
+          <p:nvPr/>
+        </p:nvSpPr>
+        <p:spPr>
+          <a:xfrm>
+            <a:off x="5867400" y="2743200"/>
+            <a:ext cx="1828800" cy="1295400"/>
+          </a:xfrm>
+          <a:prstGeom prst="roundRect">
+            <a:avLst/>
+          </a:prstGeom>
+          <a:solidFill>
+            <a:srgbClr val="62EB76"/>
+          </a:solidFill>
+          <a:ln>
+            <a:noFill/>
+          </a:ln>
+        </p:spPr>
+        <p:style>
+          <a:lnRef idx="2">
+            <a:schemeClr val="accent1">
+              <a:shade val="50000"/>
+            </a:schemeClr>
+          </a:lnRef>
+          <a:fillRef idx="1">
+            <a:schemeClr val="accent1"/>
+          </a:fillRef>
+          <a:effectRef idx="0">
+            <a:schemeClr val="accent1"/>
+          </a:effectRef>
+          <a:fontRef idx="minor">
+            <a:schemeClr val="lt1"/>
+          </a:fontRef>
+        </p:style>
+        <p:txBody>
+          <a:bodyPr rtlCol="0" anchor="ctr"/>
+          <a:lstStyle/>
+          <a:p>
+            <a:pPr algn="ctr"/>
+            <a:endParaRPr lang="zh-CN" altLang="en-US"/>
+          </a:p>
+        </p:txBody>
+      </p:sp>
+      <p:sp>
+        <p:nvSpPr>
+          <p:cNvPr id="10" name="fillColor"/>
+          <p:cNvSpPr/>
+          <p:nvPr/>
+        </p:nvSpPr>
+        <p:spPr>
+          <a:xfrm>
+            <a:off x="5867400" y="4267200"/>
+            <a:ext cx="1828800" cy="1295400"/>
+          </a:xfrm>
+          <a:prstGeom prst="roundRect">
+            <a:avLst/>
+          </a:prstGeom>
+          <a:solidFill>
+            <a:srgbClr val="6294EB"/>
+          </a:solidFill>
+          <a:ln>
+            <a:noFill/>
+          </a:ln>
+        </p:spPr>
+        <p:style>
+          <a:lnRef idx="2">
+            <a:schemeClr val="accent1">
+              <a:shade val="50000"/>
+            </a:schemeClr>
+          </a:lnRef>
+          <a:fillRef idx="1">
+            <a:schemeClr val="accent1"/>
+          </a:fillRef>
+          <a:effectRef idx="0">
+            <a:schemeClr val="accent1"/>
+          </a:effectRef>
+          <a:fontRef idx="minor">
+            <a:schemeClr val="lt1"/>
+          </a:fontRef>
+        </p:style>
+        <p:txBody>
+          <a:bodyPr rtlCol="0" anchor="ctr"/>
+          <a:lstStyle/>
+          <a:p>
+            <a:pPr algn="ctr"/>
+            <a:endParaRPr lang="zh-CN" altLang="en-US"/>
+          </a:p>
+        </p:txBody>
+      </p:sp>
+      <p:sp>
+        <p:nvSpPr>
+          <p:cNvPr id="11" name="TextBox 8"/>
+          <p:cNvSpPr txBox="1"/>
+          <p:nvPr/>
+        </p:nvSpPr>
+        <p:spPr>
+          <a:xfrm>
+            <a:off x="7848600" y="1682234"/>
+            <a:ext cx="1131272" cy="369332"/>
+          </a:xfrm>
+          <a:prstGeom prst="rect">
+            <a:avLst/>
+          </a:prstGeom>
+          <a:noFill/>
+        </p:spPr>
+        <p:txBody>
+          <a:bodyPr wrap="none" rtlCol="0">
+            <a:spAutoFit/>
+          </a:bodyPr>
+          <a:lstStyle/>
+          <a:p>
+            <a:r>
+              <a:rPr lang="en-US" altLang="zh-CN" dirty="0" smtClean="0"/>
+              <a:t>Font color</a:t>
+            </a:r>
+            <a:endParaRPr lang="zh-CN" altLang="en-US" dirty="0"/>
+          </a:p>
+        </p:txBody>
+      </p:sp>
+      <p:sp>
+        <p:nvSpPr>
+          <p:cNvPr id="12" name="TextBox 9"/>
+          <p:cNvSpPr txBox="1"/>
+          <p:nvPr/>
+        </p:nvSpPr>
+        <p:spPr>
+          <a:xfrm>
+            <a:off x="7974852" y="3067734"/>
+            <a:ext cx="878767" cy="646331"/>
+          </a:xfrm>
+          <a:prstGeom prst="rect">
+            <a:avLst/>
+          </a:prstGeom>
+          <a:noFill/>
+        </p:spPr>
+        <p:txBody>
+          <a:bodyPr wrap="none" rtlCol="0">
+            <a:spAutoFit/>
+          </a:bodyPr>
+          <a:lstStyle/>
+          <a:p>
+            <a:r>
+              <a:rPr lang="en-US" altLang="zh-CN" dirty="0" smtClean="0"/>
+              <a:t>Outline</a:t>
+            </a:r>
+          </a:p>
+          <a:p>
+            <a:r>
+              <a:rPr lang="en-US" altLang="zh-CN" dirty="0" smtClean="0"/>
+              <a:t>color</a:t>
+            </a:r>
+            <a:endParaRPr lang="zh-CN" altLang="en-US" dirty="0"/>
+          </a:p>
+        </p:txBody>
+      </p:sp>
+      <p:sp>
+        <p:nvSpPr>
+          <p:cNvPr id="13" name="TextBox 10"/>
+          <p:cNvSpPr txBox="1"/>
+          <p:nvPr/>
+        </p:nvSpPr>
+        <p:spPr>
+          <a:xfrm>
+            <a:off x="7861300" y="4700199"/>
+            <a:ext cx="974626" cy="369332"/>
+          </a:xfrm>
+          <a:prstGeom prst="rect">
+            <a:avLst/>
+          </a:prstGeom>
+          <a:noFill/>
+        </p:spPr>
+        <p:txBody>
+          <a:bodyPr wrap="none" rtlCol="0">
+            <a:spAutoFit/>
+          </a:bodyPr>
+          <a:lstStyle/>
+          <a:p>
+            <a:r>
+              <a:rPr lang="en-US" altLang="zh-CN" dirty="0" smtClean="0"/>
+              <a:t>Fill color</a:t>
+            </a:r>
+            <a:endParaRPr lang="zh-CN" altLang="en-US" dirty="0"/>
+          </a:p>
+        </p:txBody>
+      </p:sp>
+    </p:spTree>
+    <p:extLst>
+      <p:ext uri="{BB962C8B-B14F-4D97-AF65-F5344CB8AC3E}">
+        <p14:creationId xmlns:p14="http://schemas.microsoft.com/office/powerpoint/2010/main" val="2409167818"/>
+      </p:ext>
+    </p:extLst>
+  </p:cSld>
+  <p:clrMapOvr>
+    <a:masterClrMapping/>
+  </p:clrMapOvr>
+</p:sld>
+</file>
+
+<file path=ppt/slides/slide9.xml><?xml version="1.0" encoding="utf-8"?>
 <p:sld xmlns:a="http://schemas.openxmlformats.org/drawingml/2006/main" xmlns:r="http://schemas.openxmlformats.org/officeDocument/2006/relationships" xmlns:p="http://schemas.openxmlformats.org/presentationml/2006/main" show="0">
   <p:cSld name="PPAck201403240026082737">
     <p:spTree>

</xml_diff>

<commit_message>
Rewrite FT for ColorsLab (other matching rects and favourites)
</commit_message>
<xml_diff>
--- a/doc/test/ColorsLab/ColorsLab.pptx
+++ b/doc/test/ColorsLab/ColorsLab.pptx
@@ -7,7 +7,7 @@
     <p:sldMasterId id="2147483672" r:id="rId3"/>
   </p:sldMasterIdLst>
   <p:notesMasterIdLst>
-    <p:notesMasterId r:id="rId13"/>
+    <p:notesMasterId r:id="rId15"/>
   </p:notesMasterIdLst>
   <p:sldIdLst>
     <p:sldId id="287" r:id="rId4"/>
@@ -18,7 +18,9 @@
     <p:sldId id="298" r:id="rId9"/>
     <p:sldId id="301" r:id="rId10"/>
     <p:sldId id="302" r:id="rId11"/>
-    <p:sldId id="274" r:id="rId12"/>
+    <p:sldId id="303" r:id="rId12"/>
+    <p:sldId id="304" r:id="rId13"/>
+    <p:sldId id="274" r:id="rId14"/>
   </p:sldIdLst>
   <p:sldSz cx="9144000" cy="6858000" type="screen4x3"/>
   <p:notesSz cx="6858000" cy="9144000"/>
@@ -134,6 +136,8 @@
             <p14:sldId id="298"/>
             <p14:sldId id="301"/>
             <p14:sldId id="302"/>
+            <p14:sldId id="303"/>
+            <p14:sldId id="304"/>
             <p14:sldId id="274"/>
           </p14:sldIdLst>
         </p14:section>
@@ -1013,11 +1017,7 @@
           <a:p>
             <a:r>
               <a:rPr lang="en-US" altLang="zh-CN" b="1" dirty="0" smtClean="0"/>
-              <a:t>Expected: </a:t>
-            </a:r>
-            <a:r>
-              <a:rPr lang="en-US" altLang="zh-CN" b="1" dirty="0" smtClean="0"/>
-              <a:t>Apply monochrome1 as line, monochrome</a:t>
+              <a:t>Expected: Apply monochrome1 as line, monochrome</a:t>
             </a:r>
             <a:r>
               <a:rPr lang="en-US" altLang="zh-CN" b="1" baseline="0" dirty="0" smtClean="0"/>
@@ -1058,6 +1058,286 @@
     <p:extLst>
       <p:ext uri="{BB962C8B-B14F-4D97-AF65-F5344CB8AC3E}">
         <p14:creationId xmlns:p14="http://schemas.microsoft.com/office/powerpoint/2010/main" val="2793821237"/>
+      </p:ext>
+    </p:extLst>
+  </p:cSld>
+  <p:clrMapOvr>
+    <a:masterClrMapping/>
+  </p:clrMapOvr>
+</p:notes>
+</file>
+
+<file path=ppt/notesSlides/notesSlide7.xml><?xml version="1.0" encoding="utf-8"?>
+<p:notes xmlns:a="http://schemas.openxmlformats.org/drawingml/2006/main" xmlns:r="http://schemas.openxmlformats.org/officeDocument/2006/relationships" xmlns:p="http://schemas.openxmlformats.org/presentationml/2006/main">
+  <p:cSld>
+    <p:spTree>
+      <p:nvGrpSpPr>
+        <p:cNvPr id="1" name=""/>
+        <p:cNvGrpSpPr/>
+        <p:nvPr/>
+      </p:nvGrpSpPr>
+      <p:grpSpPr>
+        <a:xfrm>
+          <a:off x="0" y="0"/>
+          <a:ext cx="0" cy="0"/>
+          <a:chOff x="0" y="0"/>
+          <a:chExt cx="0" cy="0"/>
+        </a:xfrm>
+      </p:grpSpPr>
+      <p:sp>
+        <p:nvSpPr>
+          <p:cNvPr id="2" name="Slide Image Placeholder 1"/>
+          <p:cNvSpPr>
+            <a:spLocks noGrp="1" noRot="1" noChangeAspect="1"/>
+          </p:cNvSpPr>
+          <p:nvPr>
+            <p:ph type="sldImg"/>
+          </p:nvPr>
+        </p:nvSpPr>
+        <p:spPr/>
+      </p:sp>
+      <p:sp>
+        <p:nvSpPr>
+          <p:cNvPr id="3" name="Notes Placeholder 2"/>
+          <p:cNvSpPr>
+            <a:spLocks noGrp="1"/>
+          </p:cNvSpPr>
+          <p:nvPr>
+            <p:ph type="body" idx="1"/>
+          </p:nvPr>
+        </p:nvSpPr>
+        <p:spPr/>
+        <p:txBody>
+          <a:bodyPr/>
+          <a:lstStyle/>
+          <a:p>
+            <a:r>
+              <a:rPr lang="en-US" altLang="zh-CN" b="1" dirty="0" smtClean="0"/>
+              <a:t>Expected:</a:t>
+            </a:r>
+          </a:p>
+          <a:p>
+            <a:pPr marL="228600" indent="-228600">
+              <a:buAutoNum type="arabicParenR"/>
+            </a:pPr>
+            <a:r>
+              <a:rPr lang="en-US" altLang="zh-CN" b="1" baseline="0" dirty="0" err="1" smtClean="0"/>
+              <a:t>Eyedrop</a:t>
+            </a:r>
+            <a:r>
+              <a:rPr lang="en-US" altLang="zh-CN" b="1" baseline="0" dirty="0" smtClean="0"/>
+              <a:t> font </a:t>
+            </a:r>
+            <a:r>
+              <a:rPr lang="en-US" altLang="zh-CN" b="1" baseline="0" dirty="0" err="1" smtClean="0"/>
+              <a:t>colour</a:t>
+            </a:r>
+            <a:r>
+              <a:rPr lang="en-US" altLang="zh-CN" b="1" baseline="0" dirty="0" smtClean="0"/>
+              <a:t> shape</a:t>
+            </a:r>
+          </a:p>
+          <a:p>
+            <a:pPr marL="228600" indent="-228600">
+              <a:buAutoNum type="arabicParenR"/>
+            </a:pPr>
+            <a:r>
+              <a:rPr lang="en-US" altLang="zh-CN" b="1" dirty="0" smtClean="0"/>
+              <a:t>Click</a:t>
+            </a:r>
+            <a:r>
+              <a:rPr lang="en-US" altLang="zh-CN" b="1" baseline="0" dirty="0" smtClean="0"/>
+              <a:t> analogous1, then apply as text from main color </a:t>
+            </a:r>
+            <a:r>
+              <a:rPr lang="en-US" altLang="zh-CN" b="1" baseline="0" dirty="0" err="1" smtClean="0"/>
+              <a:t>rect</a:t>
+            </a:r>
+            <a:endParaRPr lang="en-US" altLang="zh-CN" b="1" baseline="0" dirty="0" smtClean="0"/>
+          </a:p>
+          <a:p>
+            <a:pPr marL="228600" indent="-228600">
+              <a:buAutoNum type="arabicParenR"/>
+            </a:pPr>
+            <a:r>
+              <a:rPr lang="en-US" altLang="zh-CN" b="1" baseline="0" dirty="0" smtClean="0"/>
+              <a:t>Click complementary3, then apply as line from main color </a:t>
+            </a:r>
+            <a:r>
+              <a:rPr lang="en-US" altLang="zh-CN" b="1" baseline="0" dirty="0" err="1" smtClean="0"/>
+              <a:t>rect</a:t>
+            </a:r>
+            <a:endParaRPr lang="en-US" altLang="zh-CN" b="1" dirty="0" smtClean="0"/>
+          </a:p>
+        </p:txBody>
+      </p:sp>
+      <p:sp>
+        <p:nvSpPr>
+          <p:cNvPr id="4" name="Slide Number Placeholder 3"/>
+          <p:cNvSpPr>
+            <a:spLocks noGrp="1"/>
+          </p:cNvSpPr>
+          <p:nvPr>
+            <p:ph type="sldNum" sz="quarter" idx="10"/>
+          </p:nvPr>
+        </p:nvSpPr>
+        <p:spPr/>
+        <p:txBody>
+          <a:bodyPr/>
+          <a:lstStyle/>
+          <a:p>
+            <a:fld id="{E96FB07A-B1AD-4238-A6C9-967239C45D18}" type="slidenum">
+              <a:rPr lang="en-SG" smtClean="0"/>
+              <a:t>9</a:t>
+            </a:fld>
+            <a:endParaRPr lang="en-SG"/>
+          </a:p>
+        </p:txBody>
+      </p:sp>
+    </p:spTree>
+    <p:extLst>
+      <p:ext uri="{BB962C8B-B14F-4D97-AF65-F5344CB8AC3E}">
+        <p14:creationId xmlns:p14="http://schemas.microsoft.com/office/powerpoint/2010/main" val="3269249504"/>
+      </p:ext>
+    </p:extLst>
+  </p:cSld>
+  <p:clrMapOvr>
+    <a:masterClrMapping/>
+  </p:clrMapOvr>
+</p:notes>
+</file>
+
+<file path=ppt/notesSlides/notesSlide8.xml><?xml version="1.0" encoding="utf-8"?>
+<p:notes xmlns:a="http://schemas.openxmlformats.org/drawingml/2006/main" xmlns:r="http://schemas.openxmlformats.org/officeDocument/2006/relationships" xmlns:p="http://schemas.openxmlformats.org/presentationml/2006/main">
+  <p:cSld>
+    <p:spTree>
+      <p:nvGrpSpPr>
+        <p:cNvPr id="1" name=""/>
+        <p:cNvGrpSpPr/>
+        <p:nvPr/>
+      </p:nvGrpSpPr>
+      <p:grpSpPr>
+        <a:xfrm>
+          <a:off x="0" y="0"/>
+          <a:ext cx="0" cy="0"/>
+          <a:chOff x="0" y="0"/>
+          <a:chExt cx="0" cy="0"/>
+        </a:xfrm>
+      </p:grpSpPr>
+      <p:sp>
+        <p:nvSpPr>
+          <p:cNvPr id="2" name="Slide Image Placeholder 1"/>
+          <p:cNvSpPr>
+            <a:spLocks noGrp="1" noRot="1" noChangeAspect="1"/>
+          </p:cNvSpPr>
+          <p:nvPr>
+            <p:ph type="sldImg"/>
+          </p:nvPr>
+        </p:nvSpPr>
+        <p:spPr/>
+      </p:sp>
+      <p:sp>
+        <p:nvSpPr>
+          <p:cNvPr id="3" name="Notes Placeholder 2"/>
+          <p:cNvSpPr>
+            <a:spLocks noGrp="1"/>
+          </p:cNvSpPr>
+          <p:nvPr>
+            <p:ph type="body" idx="1"/>
+          </p:nvPr>
+        </p:nvSpPr>
+        <p:spPr/>
+        <p:txBody>
+          <a:bodyPr/>
+          <a:lstStyle/>
+          <a:p>
+            <a:r>
+              <a:rPr lang="en-US" altLang="zh-CN" b="1" dirty="0" smtClean="0"/>
+              <a:t>Expected:</a:t>
+            </a:r>
+          </a:p>
+          <a:p>
+            <a:pPr marL="228600" indent="-228600">
+              <a:buAutoNum type="arabicParenR"/>
+            </a:pPr>
+            <a:r>
+              <a:rPr lang="en-US" altLang="zh-CN" b="1" baseline="0" dirty="0" err="1" smtClean="0"/>
+              <a:t>Eyedrop</a:t>
+            </a:r>
+            <a:r>
+              <a:rPr lang="en-US" altLang="zh-CN" b="1" baseline="0" dirty="0" smtClean="0"/>
+              <a:t> outline </a:t>
+            </a:r>
+            <a:r>
+              <a:rPr lang="en-US" altLang="zh-CN" b="1" baseline="0" dirty="0" err="1" smtClean="0"/>
+              <a:t>colour</a:t>
+            </a:r>
+            <a:r>
+              <a:rPr lang="en-US" altLang="zh-CN" b="1" baseline="0" dirty="0" smtClean="0"/>
+              <a:t> shape</a:t>
+            </a:r>
+          </a:p>
+          <a:p>
+            <a:pPr marL="228600" indent="-228600">
+              <a:buAutoNum type="arabicParenR"/>
+            </a:pPr>
+            <a:r>
+              <a:rPr lang="en-US" altLang="zh-CN" b="1" dirty="0" smtClean="0"/>
+              <a:t>Click</a:t>
+            </a:r>
+            <a:r>
+              <a:rPr lang="en-US" altLang="zh-CN" b="1" baseline="0" dirty="0" smtClean="0"/>
+              <a:t> triadic3, then apply as fill from main color </a:t>
+            </a:r>
+            <a:r>
+              <a:rPr lang="en-US" altLang="zh-CN" b="1" baseline="0" dirty="0" err="1" smtClean="0"/>
+              <a:t>rect</a:t>
+            </a:r>
+            <a:endParaRPr lang="en-US" altLang="zh-CN" b="1" baseline="0" dirty="0" smtClean="0"/>
+          </a:p>
+          <a:p>
+            <a:pPr marL="228600" indent="-228600">
+              <a:buAutoNum type="arabicParenR"/>
+            </a:pPr>
+            <a:r>
+              <a:rPr lang="en-US" altLang="zh-CN" b="1" baseline="0" dirty="0" smtClean="0"/>
+              <a:t>Click tetradic4, then apply as line from main color </a:t>
+            </a:r>
+            <a:r>
+              <a:rPr lang="en-US" altLang="zh-CN" b="1" baseline="0" dirty="0" err="1" smtClean="0"/>
+              <a:t>rect</a:t>
+            </a:r>
+            <a:endParaRPr lang="en-US" altLang="zh-CN" b="1" dirty="0" smtClean="0"/>
+          </a:p>
+        </p:txBody>
+      </p:sp>
+      <p:sp>
+        <p:nvSpPr>
+          <p:cNvPr id="4" name="Slide Number Placeholder 3"/>
+          <p:cNvSpPr>
+            <a:spLocks noGrp="1"/>
+          </p:cNvSpPr>
+          <p:nvPr>
+            <p:ph type="sldNum" sz="quarter" idx="10"/>
+          </p:nvPr>
+        </p:nvSpPr>
+        <p:spPr/>
+        <p:txBody>
+          <a:bodyPr/>
+          <a:lstStyle/>
+          <a:p>
+            <a:fld id="{E96FB07A-B1AD-4238-A6C9-967239C45D18}" type="slidenum">
+              <a:rPr lang="en-SG" smtClean="0"/>
+              <a:t>10</a:t>
+            </a:fld>
+            <a:endParaRPr lang="en-SG"/>
+          </a:p>
+        </p:txBody>
+      </p:sp>
+    </p:spTree>
+    <p:extLst>
+      <p:ext uri="{BB962C8B-B14F-4D97-AF65-F5344CB8AC3E}">
+        <p14:creationId xmlns:p14="http://schemas.microsoft.com/office/powerpoint/2010/main" val="114621062"/>
       </p:ext>
     </p:extLst>
   </p:cSld>
@@ -10273,6 +10553,435 @@
 </p:sld>
 </file>
 
+<file path=ppt/slides/slide10.xml><?xml version="1.0" encoding="utf-8"?>
+<p:sld xmlns:a="http://schemas.openxmlformats.org/drawingml/2006/main" xmlns:r="http://schemas.openxmlformats.org/officeDocument/2006/relationships" xmlns:p="http://schemas.openxmlformats.org/presentationml/2006/main">
+  <p:cSld>
+    <p:bg>
+      <p:bgPr>
+        <a:solidFill>
+          <a:schemeClr val="bg1"/>
+        </a:solidFill>
+        <a:effectLst/>
+      </p:bgPr>
+    </p:bg>
+    <p:spTree>
+      <p:nvGrpSpPr>
+        <p:cNvPr id="1" name=""/>
+        <p:cNvGrpSpPr/>
+        <p:nvPr/>
+      </p:nvGrpSpPr>
+      <p:grpSpPr>
+        <a:xfrm>
+          <a:off x="0" y="0"/>
+          <a:ext cx="0" cy="0"/>
+          <a:chOff x="0" y="0"/>
+          <a:chExt cx="0" cy="0"/>
+        </a:xfrm>
+      </p:grpSpPr>
+      <p:sp>
+        <p:nvSpPr>
+          <p:cNvPr id="3" name="selectMe"/>
+          <p:cNvSpPr/>
+          <p:nvPr/>
+        </p:nvSpPr>
+        <p:spPr>
+          <a:xfrm>
+            <a:off x="1524000" y="990600"/>
+            <a:ext cx="2743200" cy="4572000"/>
+          </a:xfrm>
+          <a:prstGeom prst="roundRect">
+            <a:avLst/>
+          </a:prstGeom>
+          <a:solidFill>
+            <a:srgbClr val="7662EB"/>
+          </a:solidFill>
+          <a:ln w="203200">
+            <a:solidFill>
+              <a:srgbClr val="62EBBB"/>
+            </a:solidFill>
+          </a:ln>
+        </p:spPr>
+        <p:style>
+          <a:lnRef idx="2">
+            <a:schemeClr val="accent1">
+              <a:shade val="50000"/>
+            </a:schemeClr>
+          </a:lnRef>
+          <a:fillRef idx="1">
+            <a:schemeClr val="accent1"/>
+          </a:fillRef>
+          <a:effectRef idx="0">
+            <a:schemeClr val="accent1"/>
+          </a:effectRef>
+          <a:fontRef idx="minor">
+            <a:schemeClr val="lt1"/>
+          </a:fontRef>
+        </p:style>
+        <p:txBody>
+          <a:bodyPr rtlCol="0" anchor="ctr"/>
+          <a:lstStyle/>
+          <a:p>
+            <a:pPr algn="ctr"/>
+            <a:r>
+              <a:rPr lang="en-US" altLang="zh-CN" sz="6600" dirty="0" smtClean="0">
+                <a:solidFill>
+                  <a:srgbClr val="EB6292"/>
+                </a:solidFill>
+                <a:latin typeface="Times New Roman" panose="02020603050405020304" pitchFamily="18" charset="0"/>
+                <a:cs typeface="Times New Roman" panose="02020603050405020304" pitchFamily="18" charset="0"/>
+              </a:rPr>
+              <a:t>TEXT</a:t>
+            </a:r>
+            <a:endParaRPr lang="zh-CN" altLang="en-US" sz="6600" dirty="0">
+              <a:solidFill>
+                <a:srgbClr val="EB6292"/>
+              </a:solidFill>
+              <a:latin typeface="Times New Roman" panose="02020603050405020304" pitchFamily="18" charset="0"/>
+              <a:cs typeface="Times New Roman" panose="02020603050405020304" pitchFamily="18" charset="0"/>
+            </a:endParaRPr>
+          </a:p>
+        </p:txBody>
+      </p:sp>
+      <p:sp>
+        <p:nvSpPr>
+          <p:cNvPr id="6" name="fontColor"/>
+          <p:cNvSpPr/>
+          <p:nvPr/>
+        </p:nvSpPr>
+        <p:spPr>
+          <a:xfrm>
+            <a:off x="5867400" y="1219200"/>
+            <a:ext cx="1828800" cy="1295400"/>
+          </a:xfrm>
+          <a:prstGeom prst="roundRect">
+            <a:avLst/>
+          </a:prstGeom>
+          <a:solidFill>
+            <a:srgbClr val="EB7662"/>
+          </a:solidFill>
+          <a:ln>
+            <a:noFill/>
+          </a:ln>
+        </p:spPr>
+        <p:style>
+          <a:lnRef idx="2">
+            <a:schemeClr val="accent1">
+              <a:shade val="50000"/>
+            </a:schemeClr>
+          </a:lnRef>
+          <a:fillRef idx="1">
+            <a:schemeClr val="accent1"/>
+          </a:fillRef>
+          <a:effectRef idx="0">
+            <a:schemeClr val="accent1"/>
+          </a:effectRef>
+          <a:fontRef idx="minor">
+            <a:schemeClr val="lt1"/>
+          </a:fontRef>
+        </p:style>
+        <p:txBody>
+          <a:bodyPr rtlCol="0" anchor="ctr"/>
+          <a:lstStyle/>
+          <a:p>
+            <a:pPr algn="ctr"/>
+            <a:endParaRPr lang="zh-CN" altLang="en-US"/>
+          </a:p>
+        </p:txBody>
+      </p:sp>
+      <p:sp>
+        <p:nvSpPr>
+          <p:cNvPr id="9" name="lineColor"/>
+          <p:cNvSpPr/>
+          <p:nvPr/>
+        </p:nvSpPr>
+        <p:spPr>
+          <a:xfrm>
+            <a:off x="5867400" y="2743200"/>
+            <a:ext cx="1828800" cy="1295400"/>
+          </a:xfrm>
+          <a:prstGeom prst="roundRect">
+            <a:avLst/>
+          </a:prstGeom>
+          <a:solidFill>
+            <a:srgbClr val="62EB76"/>
+          </a:solidFill>
+          <a:ln>
+            <a:noFill/>
+          </a:ln>
+        </p:spPr>
+        <p:style>
+          <a:lnRef idx="2">
+            <a:schemeClr val="accent1">
+              <a:shade val="50000"/>
+            </a:schemeClr>
+          </a:lnRef>
+          <a:fillRef idx="1">
+            <a:schemeClr val="accent1"/>
+          </a:fillRef>
+          <a:effectRef idx="0">
+            <a:schemeClr val="accent1"/>
+          </a:effectRef>
+          <a:fontRef idx="minor">
+            <a:schemeClr val="lt1"/>
+          </a:fontRef>
+        </p:style>
+        <p:txBody>
+          <a:bodyPr rtlCol="0" anchor="ctr"/>
+          <a:lstStyle/>
+          <a:p>
+            <a:pPr algn="ctr"/>
+            <a:endParaRPr lang="zh-CN" altLang="en-US"/>
+          </a:p>
+        </p:txBody>
+      </p:sp>
+      <p:sp>
+        <p:nvSpPr>
+          <p:cNvPr id="10" name="fillColor"/>
+          <p:cNvSpPr/>
+          <p:nvPr/>
+        </p:nvSpPr>
+        <p:spPr>
+          <a:xfrm>
+            <a:off x="5867400" y="4267200"/>
+            <a:ext cx="1828800" cy="1295400"/>
+          </a:xfrm>
+          <a:prstGeom prst="roundRect">
+            <a:avLst/>
+          </a:prstGeom>
+          <a:solidFill>
+            <a:srgbClr val="6294EB"/>
+          </a:solidFill>
+          <a:ln>
+            <a:noFill/>
+          </a:ln>
+        </p:spPr>
+        <p:style>
+          <a:lnRef idx="2">
+            <a:schemeClr val="accent1">
+              <a:shade val="50000"/>
+            </a:schemeClr>
+          </a:lnRef>
+          <a:fillRef idx="1">
+            <a:schemeClr val="accent1"/>
+          </a:fillRef>
+          <a:effectRef idx="0">
+            <a:schemeClr val="accent1"/>
+          </a:effectRef>
+          <a:fontRef idx="minor">
+            <a:schemeClr val="lt1"/>
+          </a:fontRef>
+        </p:style>
+        <p:txBody>
+          <a:bodyPr rtlCol="0" anchor="ctr"/>
+          <a:lstStyle/>
+          <a:p>
+            <a:pPr algn="ctr"/>
+            <a:endParaRPr lang="zh-CN" altLang="en-US"/>
+          </a:p>
+        </p:txBody>
+      </p:sp>
+      <p:sp>
+        <p:nvSpPr>
+          <p:cNvPr id="11" name="TextBox 8"/>
+          <p:cNvSpPr txBox="1"/>
+          <p:nvPr/>
+        </p:nvSpPr>
+        <p:spPr>
+          <a:xfrm>
+            <a:off x="7848600" y="1682234"/>
+            <a:ext cx="1131272" cy="369332"/>
+          </a:xfrm>
+          <a:prstGeom prst="rect">
+            <a:avLst/>
+          </a:prstGeom>
+          <a:noFill/>
+        </p:spPr>
+        <p:txBody>
+          <a:bodyPr wrap="none" rtlCol="0">
+            <a:spAutoFit/>
+          </a:bodyPr>
+          <a:lstStyle/>
+          <a:p>
+            <a:r>
+              <a:rPr lang="en-US" altLang="zh-CN" dirty="0" smtClean="0"/>
+              <a:t>Font color</a:t>
+            </a:r>
+            <a:endParaRPr lang="zh-CN" altLang="en-US" dirty="0"/>
+          </a:p>
+        </p:txBody>
+      </p:sp>
+      <p:sp>
+        <p:nvSpPr>
+          <p:cNvPr id="12" name="TextBox 9"/>
+          <p:cNvSpPr txBox="1"/>
+          <p:nvPr/>
+        </p:nvSpPr>
+        <p:spPr>
+          <a:xfrm>
+            <a:off x="7974852" y="3067734"/>
+            <a:ext cx="878767" cy="646331"/>
+          </a:xfrm>
+          <a:prstGeom prst="rect">
+            <a:avLst/>
+          </a:prstGeom>
+          <a:noFill/>
+        </p:spPr>
+        <p:txBody>
+          <a:bodyPr wrap="none" rtlCol="0">
+            <a:spAutoFit/>
+          </a:bodyPr>
+          <a:lstStyle/>
+          <a:p>
+            <a:r>
+              <a:rPr lang="en-US" altLang="zh-CN" dirty="0" smtClean="0"/>
+              <a:t>Outline</a:t>
+            </a:r>
+          </a:p>
+          <a:p>
+            <a:r>
+              <a:rPr lang="en-US" altLang="zh-CN" dirty="0" smtClean="0"/>
+              <a:t>color</a:t>
+            </a:r>
+            <a:endParaRPr lang="zh-CN" altLang="en-US" dirty="0"/>
+          </a:p>
+        </p:txBody>
+      </p:sp>
+      <p:sp>
+        <p:nvSpPr>
+          <p:cNvPr id="13" name="TextBox 10"/>
+          <p:cNvSpPr txBox="1"/>
+          <p:nvPr/>
+        </p:nvSpPr>
+        <p:spPr>
+          <a:xfrm>
+            <a:off x="7861300" y="4700199"/>
+            <a:ext cx="974626" cy="369332"/>
+          </a:xfrm>
+          <a:prstGeom prst="rect">
+            <a:avLst/>
+          </a:prstGeom>
+          <a:noFill/>
+        </p:spPr>
+        <p:txBody>
+          <a:bodyPr wrap="none" rtlCol="0">
+            <a:spAutoFit/>
+          </a:bodyPr>
+          <a:lstStyle/>
+          <a:p>
+            <a:r>
+              <a:rPr lang="en-US" altLang="zh-CN" dirty="0" smtClean="0"/>
+              <a:t>Fill color</a:t>
+            </a:r>
+            <a:endParaRPr lang="zh-CN" altLang="en-US" dirty="0"/>
+          </a:p>
+        </p:txBody>
+      </p:sp>
+    </p:spTree>
+    <p:extLst>
+      <p:ext uri="{BB962C8B-B14F-4D97-AF65-F5344CB8AC3E}">
+        <p14:creationId xmlns:p14="http://schemas.microsoft.com/office/powerpoint/2010/main" val="4148235968"/>
+      </p:ext>
+    </p:extLst>
+  </p:cSld>
+  <p:clrMapOvr>
+    <a:masterClrMapping/>
+  </p:clrMapOvr>
+</p:sld>
+</file>
+
+<file path=ppt/slides/slide11.xml><?xml version="1.0" encoding="utf-8"?>
+<p:sld xmlns:a="http://schemas.openxmlformats.org/drawingml/2006/main" xmlns:r="http://schemas.openxmlformats.org/officeDocument/2006/relationships" xmlns:p="http://schemas.openxmlformats.org/presentationml/2006/main" show="0">
+  <p:cSld name="PPAck201403240026082737">
+    <p:spTree>
+      <p:nvGrpSpPr>
+        <p:cNvPr id="1" name=""/>
+        <p:cNvGrpSpPr/>
+        <p:nvPr/>
+      </p:nvGrpSpPr>
+      <p:grpSpPr>
+        <a:xfrm>
+          <a:off x="0" y="0"/>
+          <a:ext cx="0" cy="0"/>
+          <a:chOff x="0" y="0"/>
+          <a:chExt cx="0" cy="0"/>
+        </a:xfrm>
+      </p:grpSpPr>
+      <p:sp>
+        <p:nvSpPr>
+          <p:cNvPr id="2" name="标题 1"/>
+          <p:cNvSpPr>
+            <a:spLocks noGrp="1"/>
+          </p:cNvSpPr>
+          <p:nvPr>
+            <p:ph type="title"/>
+          </p:nvPr>
+        </p:nvSpPr>
+        <p:spPr/>
+        <p:txBody>
+          <a:bodyPr/>
+          <a:lstStyle/>
+          <a:p>
+            <a:endParaRPr lang="en-SG"/>
+          </a:p>
+        </p:txBody>
+      </p:sp>
+      <p:pic>
+        <p:nvPicPr>
+          <p:cNvPr id="4" name="内容占位符 3"/>
+          <p:cNvPicPr>
+            <a:picLocks noGrp="1"/>
+          </p:cNvPicPr>
+          <p:nvPr>
+            <p:ph idx="1"/>
+          </p:nvPr>
+        </p:nvPicPr>
+        <p:blipFill>
+          <a:blip r:embed="rId2">
+            <a:extLst>
+              <a:ext uri="{28A0092B-C50C-407E-A947-70E740481C1C}">
+                <a14:useLocalDpi xmlns:a14="http://schemas.microsoft.com/office/drawing/2010/main" val="0"/>
+              </a:ext>
+            </a:extLst>
+          </a:blip>
+          <a:stretch>
+            <a:fillRect/>
+          </a:stretch>
+        </p:blipFill>
+        <p:spPr>
+          <a:xfrm>
+            <a:off x="1074665" y="1600200"/>
+            <a:ext cx="6994670" cy="4525963"/>
+          </a:xfrm>
+        </p:spPr>
+      </p:pic>
+    </p:spTree>
+    <p:extLst>
+      <p:ext uri="{BB962C8B-B14F-4D97-AF65-F5344CB8AC3E}">
+        <p14:creationId xmlns:p14="http://schemas.microsoft.com/office/powerpoint/2010/main" val="2306293579"/>
+      </p:ext>
+    </p:extLst>
+  </p:cSld>
+  <p:clrMapOvr>
+    <a:masterClrMapping/>
+  </p:clrMapOvr>
+  <mc:AlternateContent xmlns:mc="http://schemas.openxmlformats.org/markup-compatibility/2006" xmlns:p14="http://schemas.microsoft.com/office/powerpoint/2010/main">
+    <mc:Choice Requires="p14">
+      <p:transition spd="slow" p14:dur="2000"/>
+    </mc:Choice>
+    <mc:Fallback xmlns="">
+      <p:transition spd="slow"/>
+    </mc:Fallback>
+  </mc:AlternateContent>
+  <p:timing>
+    <p:tnLst>
+      <p:par>
+        <p:cTn id="1" dur="indefinite" restart="never" nodeType="tmRoot"/>
+      </p:par>
+    </p:tnLst>
+  </p:timing>
+</p:sld>
+</file>
+
 <file path=ppt/slides/slide2.xml><?xml version="1.0" encoding="utf-8"?>
 <p:sld xmlns:a="http://schemas.openxmlformats.org/drawingml/2006/main" xmlns:r="http://schemas.openxmlformats.org/officeDocument/2006/relationships" xmlns:p="http://schemas.openxmlformats.org/presentationml/2006/main">
   <p:cSld>
@@ -12353,8 +13062,16 @@
 </file>
 
 <file path=ppt/slides/slide9.xml><?xml version="1.0" encoding="utf-8"?>
-<p:sld xmlns:a="http://schemas.openxmlformats.org/drawingml/2006/main" xmlns:r="http://schemas.openxmlformats.org/officeDocument/2006/relationships" xmlns:p="http://schemas.openxmlformats.org/presentationml/2006/main" show="0">
-  <p:cSld name="PPAck201403240026082737">
+<p:sld xmlns:a="http://schemas.openxmlformats.org/drawingml/2006/main" xmlns:r="http://schemas.openxmlformats.org/officeDocument/2006/relationships" xmlns:p="http://schemas.openxmlformats.org/presentationml/2006/main">
+  <p:cSld>
+    <p:bg>
+      <p:bgPr>
+        <a:solidFill>
+          <a:schemeClr val="bg1"/>
+        </a:solidFill>
+        <a:effectLst/>
+      </p:bgPr>
+    </p:bg>
     <p:spTree>
       <p:nvGrpSpPr>
         <p:cNvPr id="1" name=""/>
@@ -12371,77 +13088,312 @@
       </p:grpSpPr>
       <p:sp>
         <p:nvSpPr>
-          <p:cNvPr id="2" name="标题 1"/>
-          <p:cNvSpPr>
-            <a:spLocks noGrp="1"/>
-          </p:cNvSpPr>
-          <p:nvPr>
-            <p:ph type="title"/>
-          </p:nvPr>
-        </p:nvSpPr>
-        <p:spPr/>
-        <p:txBody>
-          <a:bodyPr/>
-          <a:lstStyle/>
-          <a:p>
-            <a:endParaRPr lang="en-SG"/>
-          </a:p>
-        </p:txBody>
-      </p:sp>
-      <p:pic>
-        <p:nvPicPr>
-          <p:cNvPr id="4" name="内容占位符 3"/>
-          <p:cNvPicPr>
-            <a:picLocks noGrp="1"/>
-          </p:cNvPicPr>
-          <p:nvPr>
-            <p:ph idx="1"/>
-          </p:nvPr>
-        </p:nvPicPr>
-        <p:blipFill>
-          <a:blip r:embed="rId2">
-            <a:extLst>
-              <a:ext uri="{28A0092B-C50C-407E-A947-70E740481C1C}">
-                <a14:useLocalDpi xmlns:a14="http://schemas.microsoft.com/office/drawing/2010/main" val="0"/>
-              </a:ext>
-            </a:extLst>
-          </a:blip>
-          <a:stretch>
-            <a:fillRect/>
-          </a:stretch>
-        </p:blipFill>
+          <p:cNvPr id="3" name="selectMe"/>
+          <p:cNvSpPr/>
+          <p:nvPr/>
+        </p:nvSpPr>
         <p:spPr>
           <a:xfrm>
-            <a:off x="1074665" y="1600200"/>
-            <a:ext cx="6994670" cy="4525963"/>
+            <a:off x="1524000" y="990600"/>
+            <a:ext cx="2743200" cy="4572000"/>
           </a:xfrm>
+          <a:prstGeom prst="roundRect">
+            <a:avLst/>
+          </a:prstGeom>
+          <a:solidFill>
+            <a:srgbClr val="103B89"/>
+          </a:solidFill>
+          <a:ln w="203200">
+            <a:solidFill>
+              <a:srgbClr val="62D7EB"/>
+            </a:solidFill>
+          </a:ln>
         </p:spPr>
-      </p:pic>
+        <p:style>
+          <a:lnRef idx="2">
+            <a:schemeClr val="accent1">
+              <a:shade val="50000"/>
+            </a:schemeClr>
+          </a:lnRef>
+          <a:fillRef idx="1">
+            <a:schemeClr val="accent1"/>
+          </a:fillRef>
+          <a:effectRef idx="0">
+            <a:schemeClr val="accent1"/>
+          </a:effectRef>
+          <a:fontRef idx="minor">
+            <a:schemeClr val="lt1"/>
+          </a:fontRef>
+        </p:style>
+        <p:txBody>
+          <a:bodyPr rtlCol="0" anchor="ctr"/>
+          <a:lstStyle/>
+          <a:p>
+            <a:pPr algn="ctr"/>
+            <a:r>
+              <a:rPr lang="en-US" altLang="zh-CN" sz="6600" dirty="0" smtClean="0">
+                <a:solidFill>
+                  <a:srgbClr val="EB6292"/>
+                </a:solidFill>
+                <a:latin typeface="Times New Roman" panose="02020603050405020304" pitchFamily="18" charset="0"/>
+                <a:cs typeface="Times New Roman" panose="02020603050405020304" pitchFamily="18" charset="0"/>
+              </a:rPr>
+              <a:t>TEXT</a:t>
+            </a:r>
+            <a:endParaRPr lang="zh-CN" altLang="en-US" sz="6600" dirty="0">
+              <a:solidFill>
+                <a:srgbClr val="EB6292"/>
+              </a:solidFill>
+              <a:latin typeface="Times New Roman" panose="02020603050405020304" pitchFamily="18" charset="0"/>
+              <a:cs typeface="Times New Roman" panose="02020603050405020304" pitchFamily="18" charset="0"/>
+            </a:endParaRPr>
+          </a:p>
+        </p:txBody>
+      </p:sp>
+      <p:sp>
+        <p:nvSpPr>
+          <p:cNvPr id="6" name="fontColor"/>
+          <p:cNvSpPr/>
+          <p:nvPr/>
+        </p:nvSpPr>
+        <p:spPr>
+          <a:xfrm>
+            <a:off x="5867400" y="1219200"/>
+            <a:ext cx="1828800" cy="1295400"/>
+          </a:xfrm>
+          <a:prstGeom prst="roundRect">
+            <a:avLst/>
+          </a:prstGeom>
+          <a:solidFill>
+            <a:srgbClr val="EB7662"/>
+          </a:solidFill>
+          <a:ln>
+            <a:noFill/>
+          </a:ln>
+        </p:spPr>
+        <p:style>
+          <a:lnRef idx="2">
+            <a:schemeClr val="accent1">
+              <a:shade val="50000"/>
+            </a:schemeClr>
+          </a:lnRef>
+          <a:fillRef idx="1">
+            <a:schemeClr val="accent1"/>
+          </a:fillRef>
+          <a:effectRef idx="0">
+            <a:schemeClr val="accent1"/>
+          </a:effectRef>
+          <a:fontRef idx="minor">
+            <a:schemeClr val="lt1"/>
+          </a:fontRef>
+        </p:style>
+        <p:txBody>
+          <a:bodyPr rtlCol="0" anchor="ctr"/>
+          <a:lstStyle/>
+          <a:p>
+            <a:pPr algn="ctr"/>
+            <a:endParaRPr lang="zh-CN" altLang="en-US"/>
+          </a:p>
+        </p:txBody>
+      </p:sp>
+      <p:sp>
+        <p:nvSpPr>
+          <p:cNvPr id="9" name="lineColor"/>
+          <p:cNvSpPr/>
+          <p:nvPr/>
+        </p:nvSpPr>
+        <p:spPr>
+          <a:xfrm>
+            <a:off x="5867400" y="2743200"/>
+            <a:ext cx="1828800" cy="1295400"/>
+          </a:xfrm>
+          <a:prstGeom prst="roundRect">
+            <a:avLst/>
+          </a:prstGeom>
+          <a:solidFill>
+            <a:srgbClr val="62EB76"/>
+          </a:solidFill>
+          <a:ln>
+            <a:noFill/>
+          </a:ln>
+        </p:spPr>
+        <p:style>
+          <a:lnRef idx="2">
+            <a:schemeClr val="accent1">
+              <a:shade val="50000"/>
+            </a:schemeClr>
+          </a:lnRef>
+          <a:fillRef idx="1">
+            <a:schemeClr val="accent1"/>
+          </a:fillRef>
+          <a:effectRef idx="0">
+            <a:schemeClr val="accent1"/>
+          </a:effectRef>
+          <a:fontRef idx="minor">
+            <a:schemeClr val="lt1"/>
+          </a:fontRef>
+        </p:style>
+        <p:txBody>
+          <a:bodyPr rtlCol="0" anchor="ctr"/>
+          <a:lstStyle/>
+          <a:p>
+            <a:pPr algn="ctr"/>
+            <a:endParaRPr lang="zh-CN" altLang="en-US"/>
+          </a:p>
+        </p:txBody>
+      </p:sp>
+      <p:sp>
+        <p:nvSpPr>
+          <p:cNvPr id="10" name="fillColor"/>
+          <p:cNvSpPr/>
+          <p:nvPr/>
+        </p:nvSpPr>
+        <p:spPr>
+          <a:xfrm>
+            <a:off x="5867400" y="4267200"/>
+            <a:ext cx="1828800" cy="1295400"/>
+          </a:xfrm>
+          <a:prstGeom prst="roundRect">
+            <a:avLst/>
+          </a:prstGeom>
+          <a:solidFill>
+            <a:srgbClr val="6294EB"/>
+          </a:solidFill>
+          <a:ln>
+            <a:noFill/>
+          </a:ln>
+        </p:spPr>
+        <p:style>
+          <a:lnRef idx="2">
+            <a:schemeClr val="accent1">
+              <a:shade val="50000"/>
+            </a:schemeClr>
+          </a:lnRef>
+          <a:fillRef idx="1">
+            <a:schemeClr val="accent1"/>
+          </a:fillRef>
+          <a:effectRef idx="0">
+            <a:schemeClr val="accent1"/>
+          </a:effectRef>
+          <a:fontRef idx="minor">
+            <a:schemeClr val="lt1"/>
+          </a:fontRef>
+        </p:style>
+        <p:txBody>
+          <a:bodyPr rtlCol="0" anchor="ctr"/>
+          <a:lstStyle/>
+          <a:p>
+            <a:pPr algn="ctr"/>
+            <a:endParaRPr lang="zh-CN" altLang="en-US"/>
+          </a:p>
+        </p:txBody>
+      </p:sp>
+      <p:sp>
+        <p:nvSpPr>
+          <p:cNvPr id="11" name="TextBox 8"/>
+          <p:cNvSpPr txBox="1"/>
+          <p:nvPr/>
+        </p:nvSpPr>
+        <p:spPr>
+          <a:xfrm>
+            <a:off x="7848600" y="1682234"/>
+            <a:ext cx="1131272" cy="369332"/>
+          </a:xfrm>
+          <a:prstGeom prst="rect">
+            <a:avLst/>
+          </a:prstGeom>
+          <a:noFill/>
+        </p:spPr>
+        <p:txBody>
+          <a:bodyPr wrap="none" rtlCol="0">
+            <a:spAutoFit/>
+          </a:bodyPr>
+          <a:lstStyle/>
+          <a:p>
+            <a:r>
+              <a:rPr lang="en-US" altLang="zh-CN" dirty="0" smtClean="0"/>
+              <a:t>Font color</a:t>
+            </a:r>
+            <a:endParaRPr lang="zh-CN" altLang="en-US" dirty="0"/>
+          </a:p>
+        </p:txBody>
+      </p:sp>
+      <p:sp>
+        <p:nvSpPr>
+          <p:cNvPr id="12" name="TextBox 9"/>
+          <p:cNvSpPr txBox="1"/>
+          <p:nvPr/>
+        </p:nvSpPr>
+        <p:spPr>
+          <a:xfrm>
+            <a:off x="7974852" y="3067734"/>
+            <a:ext cx="878767" cy="646331"/>
+          </a:xfrm>
+          <a:prstGeom prst="rect">
+            <a:avLst/>
+          </a:prstGeom>
+          <a:noFill/>
+        </p:spPr>
+        <p:txBody>
+          <a:bodyPr wrap="none" rtlCol="0">
+            <a:spAutoFit/>
+          </a:bodyPr>
+          <a:lstStyle/>
+          <a:p>
+            <a:r>
+              <a:rPr lang="en-US" altLang="zh-CN" dirty="0" smtClean="0"/>
+              <a:t>Outline</a:t>
+            </a:r>
+          </a:p>
+          <a:p>
+            <a:r>
+              <a:rPr lang="en-US" altLang="zh-CN" dirty="0" smtClean="0"/>
+              <a:t>color</a:t>
+            </a:r>
+            <a:endParaRPr lang="zh-CN" altLang="en-US" dirty="0"/>
+          </a:p>
+        </p:txBody>
+      </p:sp>
+      <p:sp>
+        <p:nvSpPr>
+          <p:cNvPr id="13" name="TextBox 10"/>
+          <p:cNvSpPr txBox="1"/>
+          <p:nvPr/>
+        </p:nvSpPr>
+        <p:spPr>
+          <a:xfrm>
+            <a:off x="7861300" y="4700199"/>
+            <a:ext cx="974626" cy="369332"/>
+          </a:xfrm>
+          <a:prstGeom prst="rect">
+            <a:avLst/>
+          </a:prstGeom>
+          <a:noFill/>
+        </p:spPr>
+        <p:txBody>
+          <a:bodyPr wrap="none" rtlCol="0">
+            <a:spAutoFit/>
+          </a:bodyPr>
+          <a:lstStyle/>
+          <a:p>
+            <a:r>
+              <a:rPr lang="en-US" altLang="zh-CN" dirty="0" smtClean="0"/>
+              <a:t>Fill color</a:t>
+            </a:r>
+            <a:endParaRPr lang="zh-CN" altLang="en-US" dirty="0"/>
+          </a:p>
+        </p:txBody>
+      </p:sp>
     </p:spTree>
     <p:extLst>
       <p:ext uri="{BB962C8B-B14F-4D97-AF65-F5344CB8AC3E}">
-        <p14:creationId xmlns:p14="http://schemas.microsoft.com/office/powerpoint/2010/main" val="2306293579"/>
+        <p14:creationId xmlns:p14="http://schemas.microsoft.com/office/powerpoint/2010/main" val="511559347"/>
       </p:ext>
     </p:extLst>
   </p:cSld>
   <p:clrMapOvr>
     <a:masterClrMapping/>
   </p:clrMapOvr>
-  <mc:AlternateContent xmlns:mc="http://schemas.openxmlformats.org/markup-compatibility/2006" xmlns:p14="http://schemas.microsoft.com/office/powerpoint/2010/main">
-    <mc:Choice Requires="p14">
-      <p:transition spd="slow" p14:dur="2000"/>
-    </mc:Choice>
-    <mc:Fallback xmlns="">
-      <p:transition spd="slow"/>
-    </mc:Fallback>
-  </mc:AlternateContent>
-  <p:timing>
-    <p:tnLst>
-      <p:par>
-        <p:cTn id="1" dur="indefinite" restart="never" nodeType="tmRoot"/>
-      </p:par>
-    </p:tnLst>
-  </p:timing>
 </p:sld>
 </file>
 

</xml_diff>